<commit_message>
add Ben pptx text
</commit_message>
<xml_diff>
--- a/Praesentation/Steinschlagrisiko_Präsentation.pptx
+++ b/Praesentation/Steinschlagrisiko_Präsentation.pptx
@@ -38479,7 +38479,7 @@
           <a:p>
             <a:fld id="{D249233E-F6E6-4BD5-8D0F-887AF9D15A80}" type="datetimeFigureOut">
               <a:rPr lang="de-CH" smtClean="0"/>
-              <a:t>23.01.22</a:t>
+              <a:t>24.01.2022</a:t>
             </a:fld>
             <a:endParaRPr lang="de-CH"/>
           </a:p>
@@ -39685,17 +39685,68 @@
                 <a:effectLst/>
                 <a:latin typeface="Helvetica Neue"/>
               </a:rPr>
-              <a:t>In diesem Abschnitt simulieren wir unsere Daten mit den oben entschiedenen Verteilungen für die Monte Carlo Simulation.</a:t>
+              <a:t>Wie vorhin von Pascal </a:t>
             </a:r>
-          </a:p>
-          <a:p>
-            <a:endParaRPr lang="de-DE" b="0" i="0" dirty="0">
-              <a:solidFill>
-                <a:srgbClr val="000000"/>
-              </a:solidFill>
-              <a:effectLst/>
-              <a:latin typeface="Helvetica Neue"/>
-            </a:endParaRPr>
+            <a:r>
+              <a:rPr lang="de-DE" b="0" i="0" dirty="0" err="1">
+                <a:solidFill>
+                  <a:srgbClr val="000000"/>
+                </a:solidFill>
+                <a:effectLst/>
+                <a:latin typeface="Helvetica Neue"/>
+              </a:rPr>
+              <a:t>erwaehnt</a:t>
+            </a:r>
+            <a:r>
+              <a:rPr lang="de-DE" b="0" i="0" dirty="0">
+                <a:solidFill>
+                  <a:srgbClr val="000000"/>
+                </a:solidFill>
+                <a:effectLst/>
+                <a:latin typeface="Helvetica Neue"/>
+              </a:rPr>
+              <a:t> haben wir dann entsprechend der Verteilungen mittels dem </a:t>
+            </a:r>
+            <a:r>
+              <a:rPr lang="de-DE" b="0" i="0" dirty="0" err="1">
+                <a:solidFill>
+                  <a:srgbClr val="000000"/>
+                </a:solidFill>
+                <a:effectLst/>
+                <a:latin typeface="Helvetica Neue"/>
+              </a:rPr>
+              <a:t>Scipy</a:t>
+            </a:r>
+            <a:r>
+              <a:rPr lang="de-DE" b="0" i="0" dirty="0">
+                <a:solidFill>
+                  <a:srgbClr val="000000"/>
+                </a:solidFill>
+                <a:effectLst/>
+                <a:latin typeface="Helvetica Neue"/>
+              </a:rPr>
+              <a:t> Modul, die Monte Carlo Simulation </a:t>
+            </a:r>
+            <a:r>
+              <a:rPr lang="de-DE" b="0" i="0" dirty="0" err="1">
+                <a:solidFill>
+                  <a:srgbClr val="000000"/>
+                </a:solidFill>
+                <a:effectLst/>
+                <a:latin typeface="Helvetica Neue"/>
+              </a:rPr>
+              <a:t>durchgefuehrt</a:t>
+            </a:r>
+            <a:r>
+              <a:rPr lang="de-DE" b="0" i="0" dirty="0">
+                <a:solidFill>
+                  <a:srgbClr val="000000"/>
+                </a:solidFill>
+                <a:effectLst/>
+                <a:latin typeface="Helvetica Neue"/>
+              </a:rPr>
+              <a:t>.</a:t>
+            </a:r>
           </a:p>
           <a:p>
             <a:r>
@@ -39706,7 +39757,7 @@
                 <a:effectLst/>
                 <a:latin typeface="Helvetica Neue"/>
               </a:rPr>
-              <a:t>Zuerst mit </a:t>
+              <a:t>Zuerst hatten wir es mit </a:t>
             </a:r>
             <a:r>
               <a:rPr lang="de-DE" b="0" i="0" dirty="0" err="1">
@@ -39716,7 +39767,7 @@
                 <a:effectLst/>
                 <a:latin typeface="Helvetica Neue"/>
               </a:rPr>
-              <a:t>numpy</a:t>
+              <a:t>Numpy</a:t>
             </a:r>
             <a:r>
               <a:rPr lang="de-DE" b="0" i="0" dirty="0">
@@ -39726,7 +39777,7 @@
                 <a:effectLst/>
                 <a:latin typeface="Helvetica Neue"/>
               </a:rPr>
-              <a:t> versucht, aber schlussendlich hatte </a:t>
+              <a:t> versucht, jedoch hatte </a:t>
             </a:r>
             <a:r>
               <a:rPr lang="de-DE" b="0" i="0" dirty="0" err="1">
@@ -39736,7 +39787,7 @@
                 <a:effectLst/>
                 <a:latin typeface="Helvetica Neue"/>
               </a:rPr>
-              <a:t>numpy</a:t>
+              <a:t>Numpy</a:t>
             </a:r>
             <a:r>
               <a:rPr lang="de-DE" b="0" i="0" dirty="0">
@@ -39746,7 +39797,7 @@
                 <a:effectLst/>
                 <a:latin typeface="Helvetica Neue"/>
               </a:rPr>
-              <a:t> die nötigen Verteilungsfunktionen nicht, deshalb </a:t>
+              <a:t> nur die </a:t>
             </a:r>
             <a:r>
               <a:rPr lang="de-DE" b="0" i="0" dirty="0" err="1">
@@ -39756,24 +39807,60 @@
                 <a:effectLst/>
                 <a:latin typeface="Helvetica Neue"/>
               </a:rPr>
-              <a:t>scipy</a:t>
+              <a:t>noetigsten</a:t>
             </a:r>
-            <a:endParaRPr lang="de-DE" b="0" i="0" dirty="0">
-              <a:solidFill>
-                <a:srgbClr val="000000"/>
-              </a:solidFill>
-              <a:effectLst/>
-              <a:latin typeface="Helvetica Neue"/>
-            </a:endParaRPr>
+            <a:r>
+              <a:rPr lang="de-DE" b="0" i="0" dirty="0">
+                <a:solidFill>
+                  <a:srgbClr val="000000"/>
+                </a:solidFill>
+                <a:effectLst/>
+                <a:latin typeface="Helvetica Neue"/>
+              </a:rPr>
+              <a:t> Verteilungsfunktionen</a:t>
+            </a:r>
           </a:p>
           <a:p>
-            <a:endParaRPr lang="de-DE" b="0" i="0" dirty="0">
-              <a:solidFill>
-                <a:srgbClr val="000000"/>
-              </a:solidFill>
-              <a:effectLst/>
-              <a:latin typeface="Helvetica Neue"/>
-            </a:endParaRPr>
+            <a:r>
+              <a:rPr lang="de-DE" b="0" i="0" dirty="0" err="1">
+                <a:solidFill>
+                  <a:srgbClr val="000000"/>
+                </a:solidFill>
+                <a:effectLst/>
+                <a:latin typeface="Helvetica Neue"/>
+              </a:rPr>
+              <a:t>Fuer</a:t>
+            </a:r>
+            <a:r>
+              <a:rPr lang="de-DE" b="0" i="0" dirty="0">
+                <a:solidFill>
+                  <a:srgbClr val="000000"/>
+                </a:solidFill>
+                <a:effectLst/>
+                <a:latin typeface="Helvetica Neue"/>
+              </a:rPr>
+              <a:t> die 1 Zone haben wir 50 Millionen Steine simuliert und </a:t>
+            </a:r>
+            <a:r>
+              <a:rPr lang="de-DE" b="0" i="0" dirty="0" err="1">
+                <a:solidFill>
+                  <a:srgbClr val="000000"/>
+                </a:solidFill>
+                <a:effectLst/>
+                <a:latin typeface="Helvetica Neue"/>
+              </a:rPr>
+              <a:t>fuer</a:t>
+            </a:r>
+            <a:r>
+              <a:rPr lang="de-DE" b="0" i="0" dirty="0">
+                <a:solidFill>
+                  <a:srgbClr val="000000"/>
+                </a:solidFill>
+                <a:effectLst/>
+                <a:latin typeface="Helvetica Neue"/>
+              </a:rPr>
+              <a:t> die 2 Zone nur 1/3 von 50 Millionen.</a:t>
+            </a:r>
           </a:p>
           <a:p>
             <a:r>
@@ -39784,7 +39871,7 @@
                 <a:effectLst/>
                 <a:latin typeface="Helvetica Neue"/>
               </a:rPr>
-              <a:t>1/3 von 50 </a:t>
+              <a:t>Warum wir nur 1/3 von der </a:t>
             </a:r>
             <a:r>
               <a:rPr lang="de-DE" b="0" i="0" dirty="0" err="1">
@@ -39794,7 +39881,7 @@
                 <a:effectLst/>
                 <a:latin typeface="Helvetica Neue"/>
               </a:rPr>
-              <a:t>millionen</a:t>
+              <a:t>Abloesungszone</a:t>
             </a:r>
             <a:r>
               <a:rPr lang="de-DE" b="0" i="0" dirty="0">
@@ -39804,7 +39891,131 @@
                 <a:effectLst/>
                 <a:latin typeface="Helvetica Neue"/>
               </a:rPr>
-              <a:t> erklären wird in der nächsten Folie...</a:t>
+              <a:t> 2 </a:t>
+            </a:r>
+            <a:r>
+              <a:rPr lang="de-DE" b="0" i="0" dirty="0" err="1">
+                <a:solidFill>
+                  <a:srgbClr val="000000"/>
+                </a:solidFill>
+                <a:effectLst/>
+                <a:latin typeface="Helvetica Neue"/>
+              </a:rPr>
+              <a:t>simulierrt</a:t>
+            </a:r>
+            <a:r>
+              <a:rPr lang="de-DE" b="0" i="0" dirty="0">
+                <a:solidFill>
+                  <a:srgbClr val="000000"/>
+                </a:solidFill>
+                <a:effectLst/>
+                <a:latin typeface="Helvetica Neue"/>
+              </a:rPr>
+              <a:t> haben, werde ich euch in der </a:t>
+            </a:r>
+            <a:r>
+              <a:rPr lang="de-DE" b="0" i="0" dirty="0" err="1">
+                <a:solidFill>
+                  <a:srgbClr val="000000"/>
+                </a:solidFill>
+                <a:effectLst/>
+                <a:latin typeface="Helvetica Neue"/>
+              </a:rPr>
+              <a:t>naechsten</a:t>
+            </a:r>
+            <a:r>
+              <a:rPr lang="de-DE" b="0" i="0" dirty="0">
+                <a:solidFill>
+                  <a:srgbClr val="000000"/>
+                </a:solidFill>
+                <a:effectLst/>
+                <a:latin typeface="Helvetica Neue"/>
+              </a:rPr>
+              <a:t> Folie </a:t>
+            </a:r>
+            <a:r>
+              <a:rPr lang="de-DE" b="0" i="0" dirty="0" err="1">
+                <a:solidFill>
+                  <a:srgbClr val="000000"/>
+                </a:solidFill>
+                <a:effectLst/>
+                <a:latin typeface="Helvetica Neue"/>
+              </a:rPr>
+              <a:t>erklaeren</a:t>
+            </a:r>
+            <a:r>
+              <a:rPr lang="de-DE" b="0" i="0" dirty="0">
+                <a:solidFill>
+                  <a:srgbClr val="000000"/>
+                </a:solidFill>
+                <a:effectLst/>
+                <a:latin typeface="Helvetica Neue"/>
+              </a:rPr>
+              <a:t>.  </a:t>
+            </a:r>
+          </a:p>
+          <a:p>
+            <a:r>
+              <a:rPr lang="de-DE" b="0" i="0" dirty="0">
+                <a:solidFill>
+                  <a:srgbClr val="000000"/>
+                </a:solidFill>
+                <a:effectLst/>
+                <a:latin typeface="Helvetica Neue"/>
+              </a:rPr>
+              <a:t>Jede simulierte Zufallsvariabel haben wir dann in ein neues simulierte Dataframe 1 und Dataframe 2 </a:t>
+            </a:r>
+            <a:r>
+              <a:rPr lang="de-DE" b="0" i="0" dirty="0" err="1">
+                <a:solidFill>
+                  <a:srgbClr val="000000"/>
+                </a:solidFill>
+                <a:effectLst/>
+                <a:latin typeface="Helvetica Neue"/>
+              </a:rPr>
+              <a:t>hinzugefuegt</a:t>
+            </a:r>
+            <a:r>
+              <a:rPr lang="de-DE" b="0" i="0" dirty="0">
+                <a:solidFill>
+                  <a:srgbClr val="000000"/>
+                </a:solidFill>
+                <a:effectLst/>
+                <a:latin typeface="Helvetica Neue"/>
+              </a:rPr>
+              <a:t>, um </a:t>
+            </a:r>
+            <a:r>
+              <a:rPr lang="de-DE" b="0" i="0" dirty="0" err="1">
+                <a:solidFill>
+                  <a:srgbClr val="000000"/>
+                </a:solidFill>
+                <a:effectLst/>
+                <a:latin typeface="Helvetica Neue"/>
+              </a:rPr>
+              <a:t>anschliessend</a:t>
+            </a:r>
+            <a:r>
+              <a:rPr lang="de-DE" b="0" i="0" dirty="0">
+                <a:solidFill>
+                  <a:srgbClr val="000000"/>
+                </a:solidFill>
+                <a:effectLst/>
+                <a:latin typeface="Helvetica Neue"/>
+              </a:rPr>
+              <a:t> </a:t>
+            </a:r>
+          </a:p>
+          <a:p>
+            <a:r>
+              <a:rPr lang="de-DE" b="0" i="0" dirty="0">
+                <a:solidFill>
+                  <a:srgbClr val="000000"/>
+                </a:solidFill>
+                <a:effectLst/>
+                <a:latin typeface="Helvetica Neue"/>
+              </a:rPr>
+              <a:t>Die Anzahl simulierten Jahre herauszufinden und Ordnung zu haben. </a:t>
             </a:r>
           </a:p>
         </p:txBody>
@@ -39956,19 +40167,412 @@
               <a:defRPr/>
             </a:pPr>
             <a:r>
-              <a:rPr lang="de-DE" sz="1200" noProof="0" dirty="0"/>
-              <a:t>Zone 1 auf den kumulierten Zeitabstand von Zone 2 anpassen, weil sonst nur noch Zone 1 simuliert wird.</a:t>
+              <a:rPr lang="en-US" sz="1200" noProof="0" dirty="0"/>
+              <a:t>Nun der </a:t>
+            </a:r>
+            <a:r>
+              <a:rPr lang="en-US" sz="1200" noProof="0" dirty="0" err="1"/>
+              <a:t>Grund</a:t>
+            </a:r>
+            <a:r>
+              <a:rPr lang="en-US" sz="1200" noProof="0" dirty="0"/>
+              <a:t> </a:t>
+            </a:r>
+            <a:r>
+              <a:rPr lang="en-US" sz="1200" noProof="0" dirty="0" err="1"/>
+              <a:t>warum</a:t>
+            </a:r>
+            <a:r>
+              <a:rPr lang="en-US" sz="1200" noProof="0" dirty="0"/>
+              <a:t> die </a:t>
+            </a:r>
+            <a:r>
+              <a:rPr lang="en-US" sz="1200" noProof="0" dirty="0" err="1"/>
+              <a:t>Simulierte</a:t>
+            </a:r>
+            <a:r>
+              <a:rPr lang="en-US" sz="1200" noProof="0" dirty="0"/>
+              <a:t> Zone 2 1/3 mal </a:t>
+            </a:r>
+            <a:r>
+              <a:rPr lang="en-US" sz="1200" noProof="0" dirty="0" err="1"/>
+              <a:t>kurzer</a:t>
+            </a:r>
+            <a:r>
+              <a:rPr lang="en-US" sz="1200" noProof="0" dirty="0"/>
+              <a:t> </a:t>
+            </a:r>
+            <a:r>
+              <a:rPr lang="en-US" sz="1200" noProof="0" dirty="0" err="1"/>
+              <a:t>Simuliert</a:t>
+            </a:r>
+            <a:r>
+              <a:rPr lang="en-US" sz="1200" noProof="0" dirty="0"/>
+              <a:t> </a:t>
+            </a:r>
+            <a:r>
+              <a:rPr lang="en-US" sz="1200" noProof="0" dirty="0" err="1"/>
+              <a:t>wurde</a:t>
+            </a:r>
+            <a:r>
+              <a:rPr lang="en-US" sz="1200" noProof="0" dirty="0"/>
+              <a:t> </a:t>
+            </a:r>
+            <a:r>
+              <a:rPr lang="en-US" sz="1200" noProof="0" dirty="0" err="1"/>
+              <a:t>als</a:t>
+            </a:r>
+            <a:r>
+              <a:rPr lang="en-US" sz="1200" noProof="0" dirty="0"/>
+              <a:t> Zone 1 </a:t>
+            </a:r>
+            <a:r>
+              <a:rPr lang="en-US" sz="1200" noProof="0" dirty="0" err="1"/>
+              <a:t>liegt</a:t>
+            </a:r>
+            <a:r>
+              <a:rPr lang="en-US" sz="1200" noProof="0" dirty="0"/>
+              <a:t> an den </a:t>
+            </a:r>
+            <a:r>
+              <a:rPr lang="en-US" sz="1200" noProof="0" dirty="0" err="1"/>
+              <a:t>Unterschieldlichen</a:t>
+            </a:r>
+            <a:r>
+              <a:rPr lang="en-US" sz="1200" noProof="0" dirty="0"/>
+              <a:t> </a:t>
+            </a:r>
+            <a:r>
+              <a:rPr lang="en-US" sz="1200" noProof="0" dirty="0" err="1"/>
+              <a:t>Zeitabstanden</a:t>
+            </a:r>
+            <a:r>
+              <a:rPr lang="en-US" sz="1200" noProof="0" dirty="0"/>
+              <a:t> der </a:t>
+            </a:r>
+            <a:r>
+              <a:rPr lang="en-US" sz="1200" noProof="0" dirty="0" err="1"/>
+              <a:t>Zonen</a:t>
+            </a:r>
+            <a:r>
+              <a:rPr lang="en-US" sz="1200" noProof="0" dirty="0"/>
+              <a:t>.</a:t>
+            </a:r>
+          </a:p>
+          <a:p>
+            <a:pPr marL="0" marR="0" lvl="0" indent="0" algn="l" defTabSz="914400" rtl="0" eaLnBrk="1" fontAlgn="auto" latinLnBrk="0" hangingPunct="1">
+              <a:lnSpc>
+                <a:spcPct val="100000"/>
+              </a:lnSpc>
+              <a:spcBef>
+                <a:spcPts val="0"/>
+              </a:spcBef>
+              <a:spcAft>
+                <a:spcPts val="0"/>
+              </a:spcAft>
+              <a:buClrTx/>
+              <a:buSzTx/>
+              <a:buFontTx/>
+              <a:buNone/>
+              <a:tabLst/>
+              <a:defRPr/>
+            </a:pPr>
+            <a:r>
+              <a:rPr lang="en-US" sz="1200" noProof="0" dirty="0" err="1"/>
+              <a:t>Anfangs</a:t>
+            </a:r>
+            <a:r>
+              <a:rPr lang="en-US" sz="1200" noProof="0" dirty="0"/>
+              <a:t> </a:t>
+            </a:r>
+            <a:r>
+              <a:rPr lang="en-US" sz="1200" noProof="0" dirty="0" err="1"/>
+              <a:t>hatten</a:t>
+            </a:r>
+            <a:r>
+              <a:rPr lang="en-US" sz="1200" noProof="0" dirty="0"/>
+              <a:t> </a:t>
+            </a:r>
+            <a:r>
+              <a:rPr lang="en-US" sz="1200" noProof="0" dirty="0" err="1"/>
+              <a:t>wir</a:t>
+            </a:r>
+            <a:r>
+              <a:rPr lang="en-US" sz="1200" noProof="0" dirty="0"/>
+              <a:t> </a:t>
+            </a:r>
+            <a:r>
+              <a:rPr lang="en-US" sz="1200" noProof="0" dirty="0" err="1"/>
+              <a:t>fuer</a:t>
+            </a:r>
+            <a:r>
+              <a:rPr lang="en-US" sz="1200" noProof="0" dirty="0"/>
+              <a:t> </a:t>
+            </a:r>
+            <a:r>
+              <a:rPr lang="en-US" sz="1200" noProof="0" dirty="0" err="1"/>
+              <a:t>beide</a:t>
+            </a:r>
+            <a:r>
+              <a:rPr lang="en-US" sz="1200" noProof="0" dirty="0"/>
+              <a:t> </a:t>
+            </a:r>
+            <a:r>
+              <a:rPr lang="en-US" sz="1200" noProof="0" dirty="0" err="1"/>
+              <a:t>Zonen</a:t>
+            </a:r>
+            <a:r>
+              <a:rPr lang="en-US" sz="1200" noProof="0" dirty="0"/>
+              <a:t> 50 </a:t>
+            </a:r>
+            <a:r>
+              <a:rPr lang="en-US" sz="1200" noProof="0" dirty="0" err="1"/>
+              <a:t>Millionen</a:t>
+            </a:r>
+            <a:r>
+              <a:rPr lang="en-US" sz="1200" noProof="0" dirty="0"/>
+              <a:t> </a:t>
+            </a:r>
+            <a:r>
+              <a:rPr lang="en-US" sz="1200" noProof="0" dirty="0" err="1"/>
+              <a:t>Steinen</a:t>
+            </a:r>
+            <a:r>
+              <a:rPr lang="en-US" sz="1200" noProof="0" dirty="0"/>
+              <a:t>, </a:t>
+            </a:r>
+            <a:r>
+              <a:rPr lang="en-US" sz="1200" noProof="0" dirty="0" err="1"/>
+              <a:t>uns</a:t>
+            </a:r>
+            <a:r>
+              <a:rPr lang="en-US" sz="1200" noProof="0" dirty="0"/>
+              <a:t> </a:t>
+            </a:r>
+            <a:r>
+              <a:rPr lang="en-US" sz="1200" noProof="0" dirty="0" err="1"/>
+              <a:t>ist</a:t>
+            </a:r>
+            <a:r>
+              <a:rPr lang="en-US" sz="1200" noProof="0" dirty="0"/>
+              <a:t> </a:t>
+            </a:r>
+            <a:r>
+              <a:rPr lang="en-US" sz="1200" noProof="0" dirty="0" err="1"/>
+              <a:t>dann</a:t>
+            </a:r>
+            <a:r>
+              <a:rPr lang="en-US" sz="1200" noProof="0" dirty="0"/>
+              <a:t> </a:t>
+            </a:r>
+            <a:r>
+              <a:rPr lang="en-US" sz="1200" noProof="0" dirty="0" err="1"/>
+              <a:t>jedoch</a:t>
+            </a:r>
+            <a:r>
+              <a:rPr lang="en-US" sz="1200" noProof="0" dirty="0"/>
+              <a:t> </a:t>
+            </a:r>
+            <a:r>
+              <a:rPr lang="en-US" sz="1200" noProof="0" dirty="0" err="1"/>
+              <a:t>aufgefallen</a:t>
+            </a:r>
+            <a:r>
+              <a:rPr lang="en-US" sz="1200" noProof="0" dirty="0"/>
+              <a:t> </a:t>
+            </a:r>
+            <a:r>
+              <a:rPr lang="en-US" sz="1200" noProof="0" dirty="0" err="1"/>
+              <a:t>durch</a:t>
+            </a:r>
+            <a:r>
+              <a:rPr lang="en-US" sz="1200" noProof="0" dirty="0"/>
+              <a:t> die </a:t>
+            </a:r>
+            <a:r>
+              <a:rPr lang="en-US" sz="1200" noProof="0" dirty="0" err="1"/>
+              <a:t>Kummulation</a:t>
+            </a:r>
+            <a:r>
+              <a:rPr lang="en-US" sz="1200" noProof="0" dirty="0"/>
+              <a:t> der </a:t>
+            </a:r>
+            <a:r>
+              <a:rPr lang="en-US" sz="1200" noProof="0" dirty="0" err="1"/>
+              <a:t>Zeitabstaende</a:t>
+            </a:r>
+            <a:r>
+              <a:rPr lang="en-US" sz="1200" noProof="0" dirty="0"/>
+              <a:t> </a:t>
+            </a:r>
+            <a:r>
+              <a:rPr lang="en-US" sz="1200" noProof="0" dirty="0" err="1"/>
+              <a:t>fuer</a:t>
+            </a:r>
+            <a:r>
+              <a:rPr lang="en-US" sz="1200" noProof="0" dirty="0"/>
+              <a:t> die </a:t>
+            </a:r>
+            <a:r>
+              <a:rPr lang="en-US" sz="1200" noProof="0" dirty="0" err="1"/>
+              <a:t>jeweilige</a:t>
+            </a:r>
+            <a:r>
+              <a:rPr lang="en-US" sz="1200" noProof="0" dirty="0"/>
+              <a:t> Zone, die Zone 2 ca.3 x </a:t>
+            </a:r>
+            <a:r>
+              <a:rPr lang="en-US" sz="1200" noProof="0" dirty="0" err="1"/>
+              <a:t>laenger</a:t>
+            </a:r>
+            <a:r>
+              <a:rPr lang="en-US" sz="1200" noProof="0" dirty="0"/>
+              <a:t> </a:t>
+            </a:r>
+            <a:r>
+              <a:rPr lang="en-US" sz="1200" noProof="0" dirty="0" err="1"/>
+              <a:t>simulierrt</a:t>
+            </a:r>
+            <a:r>
+              <a:rPr lang="en-US" sz="1200" noProof="0" dirty="0"/>
+              <a:t> </a:t>
+            </a:r>
+            <a:r>
+              <a:rPr lang="en-US" sz="1200" noProof="0" dirty="0" err="1"/>
+              <a:t>wird</a:t>
+            </a:r>
+            <a:r>
+              <a:rPr lang="en-US" sz="1200" noProof="0" dirty="0"/>
+              <a:t> </a:t>
+            </a:r>
+            <a:r>
+              <a:rPr lang="en-US" sz="1200" noProof="0" dirty="0" err="1"/>
+              <a:t>als</a:t>
+            </a:r>
+            <a:r>
+              <a:rPr lang="en-US" sz="1200" noProof="0" dirty="0"/>
+              <a:t> Zone 1. </a:t>
+            </a:r>
+            <a:r>
+              <a:rPr lang="de-DE" sz="1200" b="0" i="0" noProof="0" dirty="0">
+                <a:solidFill>
+                  <a:srgbClr val="000000"/>
+                </a:solidFill>
+                <a:effectLst/>
+                <a:latin typeface="Helvetica Neue"/>
+              </a:rPr>
+              <a:t>Um nun beide </a:t>
+            </a:r>
+            <a:r>
+              <a:rPr lang="de-DE" sz="1200" b="0" i="0" noProof="0" dirty="0" err="1">
+                <a:solidFill>
+                  <a:srgbClr val="000000"/>
+                </a:solidFill>
+                <a:effectLst/>
+                <a:latin typeface="Helvetica Neue"/>
+              </a:rPr>
+              <a:t>Abloesungszone</a:t>
+            </a:r>
+            <a:r>
+              <a:rPr lang="de-DE" sz="1200" b="0" i="0" noProof="0" dirty="0">
+                <a:solidFill>
+                  <a:srgbClr val="000000"/>
+                </a:solidFill>
+                <a:effectLst/>
+                <a:latin typeface="Helvetica Neue"/>
+              </a:rPr>
+              <a:t> gleich lange zu simulieren wurde dann die </a:t>
+            </a:r>
+            <a:r>
+              <a:rPr lang="de-DE" sz="1200" b="0" i="0" noProof="0" dirty="0" err="1">
+                <a:solidFill>
+                  <a:srgbClr val="000000"/>
+                </a:solidFill>
+                <a:effectLst/>
+                <a:latin typeface="Helvetica Neue"/>
+              </a:rPr>
+              <a:t>kummulierte</a:t>
+            </a:r>
+            <a:r>
+              <a:rPr lang="de-DE" sz="1200" b="0" i="0" noProof="0" dirty="0">
+                <a:solidFill>
+                  <a:srgbClr val="000000"/>
+                </a:solidFill>
+                <a:effectLst/>
+                <a:latin typeface="Helvetica Neue"/>
+              </a:rPr>
+              <a:t> Zone 1 von</a:t>
+            </a:r>
+          </a:p>
+          <a:p>
+            <a:pPr marL="0" marR="0" lvl="0" indent="0" algn="l" defTabSz="914400" rtl="0" eaLnBrk="1" fontAlgn="auto" latinLnBrk="0" hangingPunct="1">
+              <a:lnSpc>
+                <a:spcPct val="100000"/>
+              </a:lnSpc>
+              <a:spcBef>
+                <a:spcPts val="0"/>
+              </a:spcBef>
+              <a:spcAft>
+                <a:spcPts val="0"/>
+              </a:spcAft>
+              <a:buClrTx/>
+              <a:buSzTx/>
+              <a:buFontTx/>
+              <a:buNone/>
+              <a:tabLst/>
+              <a:defRPr/>
+            </a:pPr>
+            <a:r>
+              <a:rPr lang="de-DE" sz="1200" b="0" i="0" noProof="0" dirty="0">
+                <a:solidFill>
+                  <a:srgbClr val="000000"/>
+                </a:solidFill>
+                <a:effectLst/>
+                <a:latin typeface="Helvetica Neue"/>
+              </a:rPr>
+              <a:t>Der Zone 2 angepasst. Sprich wurde das </a:t>
+            </a:r>
+            <a:r>
+              <a:rPr lang="de-DE" sz="1200" b="0" i="0" noProof="0" dirty="0" err="1">
+                <a:solidFill>
+                  <a:srgbClr val="000000"/>
+                </a:solidFill>
+                <a:effectLst/>
+                <a:latin typeface="Helvetica Neue"/>
+              </a:rPr>
+              <a:t>ueberschuessige</a:t>
+            </a:r>
+            <a:r>
+              <a:rPr lang="de-DE" sz="1200" b="0" i="0" noProof="0" dirty="0">
+                <a:solidFill>
+                  <a:srgbClr val="000000"/>
+                </a:solidFill>
+                <a:effectLst/>
+                <a:latin typeface="Helvetica Neue"/>
+              </a:rPr>
+              <a:t> entfernt.  Somit wurden beide </a:t>
+            </a:r>
+            <a:r>
+              <a:rPr lang="de-DE" sz="1200" b="0" i="0" noProof="0" dirty="0" err="1">
+                <a:solidFill>
+                  <a:srgbClr val="000000"/>
+                </a:solidFill>
+                <a:effectLst/>
+                <a:latin typeface="Helvetica Neue"/>
+              </a:rPr>
+              <a:t>Abloesungszone</a:t>
+            </a:r>
+            <a:r>
+              <a:rPr lang="de-DE" sz="1200" b="0" i="0" noProof="0" dirty="0">
+                <a:solidFill>
+                  <a:srgbClr val="000000"/>
+                </a:solidFill>
+                <a:effectLst/>
+                <a:latin typeface="Helvetica Neue"/>
+              </a:rPr>
+              <a:t> gleich lange simuliert.</a:t>
             </a:r>
             <a:endParaRPr lang="de-CH" sz="1200" noProof="0" dirty="0"/>
-          </a:p>
-          <a:p>
-            <a:endParaRPr lang="de-DE" b="0" i="0" dirty="0">
-              <a:solidFill>
-                <a:srgbClr val="000000"/>
-              </a:solidFill>
-              <a:effectLst/>
-              <a:latin typeface="Helvetica Neue"/>
-            </a:endParaRPr>
           </a:p>
         </p:txBody>
       </p:sp>
@@ -40088,6 +40692,358 @@
               <a:effectLst/>
               <a:latin typeface="Helvetica Neue"/>
             </a:endParaRPr>
+          </a:p>
+          <a:p>
+            <a:r>
+              <a:rPr lang="de-DE" b="0" i="0" dirty="0">
+                <a:solidFill>
+                  <a:srgbClr val="000000"/>
+                </a:solidFill>
+                <a:effectLst/>
+                <a:latin typeface="Helvetica Neue"/>
+              </a:rPr>
+              <a:t>Da beide Dataframes voneinander getrennt sind, haben wir diese nun </a:t>
+            </a:r>
+            <a:r>
+              <a:rPr lang="de-DE" b="0" i="0" dirty="0" err="1">
+                <a:solidFill>
+                  <a:srgbClr val="000000"/>
+                </a:solidFill>
+                <a:effectLst/>
+                <a:latin typeface="Helvetica Neue"/>
+              </a:rPr>
+              <a:t>zusammengefuhert</a:t>
+            </a:r>
+            <a:r>
+              <a:rPr lang="de-DE" b="0" i="0" dirty="0">
+                <a:solidFill>
+                  <a:srgbClr val="000000"/>
+                </a:solidFill>
+                <a:effectLst/>
+                <a:latin typeface="Helvetica Neue"/>
+              </a:rPr>
+              <a:t>. Beim </a:t>
+            </a:r>
+            <a:r>
+              <a:rPr lang="de-DE" b="0" i="0" dirty="0" err="1">
+                <a:solidFill>
+                  <a:srgbClr val="000000"/>
+                </a:solidFill>
+                <a:effectLst/>
+                <a:latin typeface="Helvetica Neue"/>
+              </a:rPr>
+              <a:t>Zusammenfuehren</a:t>
+            </a:r>
+            <a:r>
+              <a:rPr lang="de-DE" b="0" i="0" dirty="0">
+                <a:solidFill>
+                  <a:srgbClr val="000000"/>
+                </a:solidFill>
+                <a:effectLst/>
+                <a:latin typeface="Helvetica Neue"/>
+              </a:rPr>
+              <a:t> ist wichtig zu beachten, dass das</a:t>
+            </a:r>
+          </a:p>
+          <a:p>
+            <a:r>
+              <a:rPr lang="de-DE" b="0" i="0" dirty="0">
+                <a:solidFill>
+                  <a:srgbClr val="000000"/>
+                </a:solidFill>
+                <a:effectLst/>
+                <a:latin typeface="Helvetica Neue"/>
+              </a:rPr>
+              <a:t>Dataframe nicht durchmischt ist. Sprich wird zuerst nur Zone 1 simuliert und </a:t>
+            </a:r>
+            <a:r>
+              <a:rPr lang="de-DE" b="0" i="0" dirty="0" err="1">
+                <a:solidFill>
+                  <a:srgbClr val="000000"/>
+                </a:solidFill>
+                <a:effectLst/>
+                <a:latin typeface="Helvetica Neue"/>
+              </a:rPr>
+              <a:t>anschliessend</a:t>
+            </a:r>
+            <a:r>
+              <a:rPr lang="de-DE" b="0" i="0" dirty="0">
+                <a:solidFill>
+                  <a:srgbClr val="000000"/>
+                </a:solidFill>
+                <a:effectLst/>
+                <a:latin typeface="Helvetica Neue"/>
+              </a:rPr>
+              <a:t> dann 2, welches nicht der </a:t>
+            </a:r>
+            <a:r>
+              <a:rPr lang="de-DE" b="0" i="0" dirty="0" err="1">
+                <a:solidFill>
+                  <a:srgbClr val="000000"/>
+                </a:solidFill>
+                <a:effectLst/>
+                <a:latin typeface="Helvetica Neue"/>
+              </a:rPr>
+              <a:t>Realitaet</a:t>
+            </a:r>
+            <a:r>
+              <a:rPr lang="de-DE" b="0" i="0" dirty="0">
+                <a:solidFill>
+                  <a:srgbClr val="000000"/>
+                </a:solidFill>
+                <a:effectLst/>
+                <a:latin typeface="Helvetica Neue"/>
+              </a:rPr>
+              <a:t> ja entspricht. Aus diesem</a:t>
+            </a:r>
+          </a:p>
+          <a:p>
+            <a:r>
+              <a:rPr lang="de-DE" b="0" i="0" dirty="0">
+                <a:solidFill>
+                  <a:srgbClr val="000000"/>
+                </a:solidFill>
+                <a:effectLst/>
+                <a:latin typeface="Helvetica Neue"/>
+              </a:rPr>
+              <a:t>Grund haben wir dann die das Dataframe aufgrund der </a:t>
+            </a:r>
+            <a:r>
+              <a:rPr lang="de-DE" b="0" i="0" dirty="0" err="1">
+                <a:solidFill>
+                  <a:srgbClr val="000000"/>
+                </a:solidFill>
+                <a:effectLst/>
+                <a:latin typeface="Helvetica Neue"/>
+              </a:rPr>
+              <a:t>kummulierten</a:t>
+            </a:r>
+            <a:r>
+              <a:rPr lang="de-DE" b="0" i="0" dirty="0">
+                <a:solidFill>
+                  <a:srgbClr val="000000"/>
+                </a:solidFill>
+                <a:effectLst/>
+                <a:latin typeface="Helvetica Neue"/>
+              </a:rPr>
+              <a:t> Zeitabstand aufsteigend sortiert. Dadurch wird Zone 1 und Zone 2 gleichzeitig simuliert. </a:t>
+            </a:r>
+          </a:p>
+          <a:p>
+            <a:r>
+              <a:rPr lang="de-DE" b="0" i="0" dirty="0">
+                <a:solidFill>
+                  <a:srgbClr val="000000"/>
+                </a:solidFill>
+                <a:effectLst/>
+                <a:latin typeface="Helvetica Neue"/>
+              </a:rPr>
+              <a:t>Um nun die Anzahl simulierten Jahre herauszufinden, </a:t>
+            </a:r>
+            <a:r>
+              <a:rPr lang="de-DE" b="0" i="0" dirty="0" err="1">
+                <a:solidFill>
+                  <a:srgbClr val="000000"/>
+                </a:solidFill>
+                <a:effectLst/>
+                <a:latin typeface="Helvetica Neue"/>
+              </a:rPr>
+              <a:t>benoetigen</a:t>
+            </a:r>
+            <a:r>
+              <a:rPr lang="de-DE" b="0" i="0" dirty="0">
+                <a:solidFill>
+                  <a:srgbClr val="000000"/>
+                </a:solidFill>
+                <a:effectLst/>
+                <a:latin typeface="Helvetica Neue"/>
+              </a:rPr>
+              <a:t> wir nun den Zeitabstand, sprich die Differenz der sortierten </a:t>
+            </a:r>
+            <a:r>
+              <a:rPr lang="de-DE" b="0" i="0" dirty="0" err="1">
+                <a:solidFill>
+                  <a:srgbClr val="000000"/>
+                </a:solidFill>
+                <a:effectLst/>
+                <a:latin typeface="Helvetica Neue"/>
+              </a:rPr>
+              <a:t>kummulierten</a:t>
+            </a:r>
+            <a:r>
+              <a:rPr lang="de-DE" b="0" i="0" dirty="0">
+                <a:solidFill>
+                  <a:srgbClr val="000000"/>
+                </a:solidFill>
+                <a:effectLst/>
+                <a:latin typeface="Helvetica Neue"/>
+              </a:rPr>
+              <a:t> </a:t>
+            </a:r>
+            <a:r>
+              <a:rPr lang="de-DE" b="0" i="0" dirty="0" err="1">
+                <a:solidFill>
+                  <a:srgbClr val="000000"/>
+                </a:solidFill>
+                <a:effectLst/>
+                <a:latin typeface="Helvetica Neue"/>
+              </a:rPr>
+              <a:t>Zeitabstaenden</a:t>
+            </a:r>
+            <a:r>
+              <a:rPr lang="de-DE" b="0" i="0" dirty="0">
+                <a:solidFill>
+                  <a:srgbClr val="000000"/>
+                </a:solidFill>
+                <a:effectLst/>
+                <a:latin typeface="Helvetica Neue"/>
+              </a:rPr>
+              <a:t>.</a:t>
+            </a:r>
+          </a:p>
+          <a:p>
+            <a:r>
+              <a:rPr lang="de-DE" b="0" i="0" dirty="0">
+                <a:solidFill>
+                  <a:srgbClr val="000000"/>
+                </a:solidFill>
+                <a:effectLst/>
+                <a:latin typeface="Helvetica Neue"/>
+              </a:rPr>
+              <a:t>Dieses haben wir Delta </a:t>
+            </a:r>
+            <a:r>
+              <a:rPr lang="de-DE" b="0" i="0" dirty="0" err="1">
+                <a:solidFill>
+                  <a:srgbClr val="000000"/>
+                </a:solidFill>
+                <a:effectLst/>
+                <a:latin typeface="Helvetica Neue"/>
+              </a:rPr>
+              <a:t>kummulierte</a:t>
+            </a:r>
+            <a:r>
+              <a:rPr lang="de-DE" b="0" i="0" dirty="0">
+                <a:solidFill>
+                  <a:srgbClr val="000000"/>
+                </a:solidFill>
+                <a:effectLst/>
+                <a:latin typeface="Helvetica Neue"/>
+              </a:rPr>
+              <a:t> Zeit genannt und </a:t>
+            </a:r>
+            <a:r>
+              <a:rPr lang="de-DE" b="0" i="0" dirty="0" err="1">
+                <a:solidFill>
+                  <a:srgbClr val="000000"/>
+                </a:solidFill>
+                <a:effectLst/>
+                <a:latin typeface="Helvetica Neue"/>
+              </a:rPr>
+              <a:t>anschliessend</a:t>
+            </a:r>
+            <a:r>
+              <a:rPr lang="de-DE" b="0" i="0" dirty="0">
+                <a:solidFill>
+                  <a:srgbClr val="000000"/>
+                </a:solidFill>
+                <a:effectLst/>
+                <a:latin typeface="Helvetica Neue"/>
+              </a:rPr>
+              <a:t> als neue Attributspalte </a:t>
+            </a:r>
+            <a:r>
+              <a:rPr lang="de-DE" b="0" i="0" dirty="0" err="1">
+                <a:solidFill>
+                  <a:srgbClr val="000000"/>
+                </a:solidFill>
+                <a:effectLst/>
+                <a:latin typeface="Helvetica Neue"/>
+              </a:rPr>
+              <a:t>hinzugefuegt</a:t>
+            </a:r>
+            <a:r>
+              <a:rPr lang="de-DE" b="0" i="0" dirty="0">
+                <a:solidFill>
+                  <a:srgbClr val="000000"/>
+                </a:solidFill>
+                <a:effectLst/>
+                <a:latin typeface="Helvetica Neue"/>
+              </a:rPr>
+              <a:t>. Die Anzahl simulierte Jahre </a:t>
+            </a:r>
+            <a:r>
+              <a:rPr lang="de-DE" b="0" i="0" dirty="0" err="1">
+                <a:solidFill>
+                  <a:srgbClr val="000000"/>
+                </a:solidFill>
+                <a:effectLst/>
+                <a:latin typeface="Helvetica Neue"/>
+              </a:rPr>
+              <a:t>laesst</a:t>
+            </a:r>
+            <a:r>
+              <a:rPr lang="de-DE" b="0" i="0" dirty="0">
+                <a:solidFill>
+                  <a:srgbClr val="000000"/>
+                </a:solidFill>
+                <a:effectLst/>
+                <a:latin typeface="Helvetica Neue"/>
+              </a:rPr>
+              <a:t> sich dann </a:t>
+            </a:r>
+          </a:p>
+          <a:p>
+            <a:r>
+              <a:rPr lang="de-DE" b="0" i="0" dirty="0">
+                <a:solidFill>
+                  <a:srgbClr val="000000"/>
+                </a:solidFill>
+                <a:effectLst/>
+                <a:latin typeface="Helvetica Neue"/>
+              </a:rPr>
+              <a:t>Durch das Aufsummieren der Delta </a:t>
+            </a:r>
+            <a:r>
+              <a:rPr lang="de-DE" b="0" i="0" dirty="0" err="1">
+                <a:solidFill>
+                  <a:srgbClr val="000000"/>
+                </a:solidFill>
+                <a:effectLst/>
+                <a:latin typeface="Helvetica Neue"/>
+              </a:rPr>
+              <a:t>kummulierte</a:t>
+            </a:r>
+            <a:r>
+              <a:rPr lang="de-DE" b="0" i="0" dirty="0">
+                <a:solidFill>
+                  <a:srgbClr val="000000"/>
+                </a:solidFill>
+                <a:effectLst/>
+                <a:latin typeface="Helvetica Neue"/>
+              </a:rPr>
+              <a:t> Zeitabstand </a:t>
+            </a:r>
+            <a:r>
+              <a:rPr lang="de-DE" b="0" i="0" dirty="0" err="1">
+                <a:solidFill>
+                  <a:srgbClr val="000000"/>
+                </a:solidFill>
+                <a:effectLst/>
+                <a:latin typeface="Helvetica Neue"/>
+              </a:rPr>
+              <a:t>dividert</a:t>
+            </a:r>
+            <a:r>
+              <a:rPr lang="de-DE" b="0" i="0" dirty="0">
+                <a:solidFill>
+                  <a:srgbClr val="000000"/>
+                </a:solidFill>
+                <a:effectLst/>
+                <a:latin typeface="Helvetica Neue"/>
+              </a:rPr>
+              <a:t> durch die Anzahl Stunden die ein Jahr hat berechnen.  </a:t>
+            </a:r>
           </a:p>
         </p:txBody>
       </p:sp>
@@ -41795,6 +42751,10 @@
           <a:bodyPr/>
           <a:lstStyle/>
           <a:p>
+            <a:r>
+              <a:rPr lang="en-US" dirty="0"/>
+              <a:t>Alex</a:t>
+            </a:r>
             <a:endParaRPr lang="de-CH" dirty="0"/>
           </a:p>
         </p:txBody>
@@ -42204,7 +43164,7 @@
           <a:p>
             <a:fld id="{80020296-3345-4314-BE3C-63AEC21FFBF4}" type="datetime1">
               <a:rPr lang="en-US" smtClean="0"/>
-              <a:t>1/23/2022</a:t>
+              <a:t>1/24/2022</a:t>
             </a:fld>
             <a:endParaRPr lang="en-US" dirty="0"/>
           </a:p>
@@ -42406,7 +43366,7 @@
           <a:p>
             <a:fld id="{5F181BB4-B15F-4781-B18E-C61D89E95F1F}" type="datetime1">
               <a:rPr lang="en-US" smtClean="0"/>
-              <a:t>1/23/2022</a:t>
+              <a:t>1/24/2022</a:t>
             </a:fld>
             <a:endParaRPr lang="en-US" dirty="0"/>
           </a:p>
@@ -42618,7 +43578,7 @@
           <a:p>
             <a:fld id="{389CB775-4552-4EC9-934E-115299A87317}" type="datetime1">
               <a:rPr lang="en-US" smtClean="0"/>
-              <a:t>1/23/2022</a:t>
+              <a:t>1/24/2022</a:t>
             </a:fld>
             <a:endParaRPr lang="en-US" dirty="0"/>
           </a:p>
@@ -42820,7 +43780,7 @@
           <a:p>
             <a:fld id="{2F906713-C74A-4CBA-B694-821617ABFF32}" type="datetime1">
               <a:rPr lang="en-US" smtClean="0"/>
-              <a:t>1/23/2022</a:t>
+              <a:t>1/24/2022</a:t>
             </a:fld>
             <a:endParaRPr lang="en-US" dirty="0"/>
           </a:p>
@@ -43098,7 +44058,7 @@
           <a:p>
             <a:fld id="{EBFE4EE4-C210-49E2-AD1E-E46D3766A14E}" type="datetime1">
               <a:rPr lang="en-US" smtClean="0"/>
-              <a:t>1/23/2022</a:t>
+              <a:t>1/24/2022</a:t>
             </a:fld>
             <a:endParaRPr lang="en-US" dirty="0"/>
           </a:p>
@@ -43368,7 +44328,7 @@
           <a:p>
             <a:fld id="{38196C97-E1A4-4DAC-B18B-328B9AC2380F}" type="datetime1">
               <a:rPr lang="en-US" smtClean="0"/>
-              <a:t>1/23/2022</a:t>
+              <a:t>1/24/2022</a:t>
             </a:fld>
             <a:endParaRPr lang="en-US" dirty="0"/>
           </a:p>
@@ -43785,7 +44745,7 @@
           <a:p>
             <a:fld id="{93CF6138-A04F-4243-B578-72E7982DA47A}" type="datetime1">
               <a:rPr lang="en-US" smtClean="0"/>
-              <a:t>1/23/2022</a:t>
+              <a:t>1/24/2022</a:t>
             </a:fld>
             <a:endParaRPr lang="en-US" dirty="0"/>
           </a:p>
@@ -43929,7 +44889,7 @@
           <a:p>
             <a:fld id="{A69CADF8-4F87-44CE-B6CA-F34C8A1A97DF}" type="datetime1">
               <a:rPr lang="en-US" smtClean="0"/>
-              <a:t>1/23/2022</a:t>
+              <a:t>1/24/2022</a:t>
             </a:fld>
             <a:endParaRPr lang="en-US" dirty="0"/>
           </a:p>
@@ -44044,7 +45004,7 @@
           <a:p>
             <a:fld id="{23E56F23-EBFB-4093-A04D-056E9FF698EB}" type="datetime1">
               <a:rPr lang="en-US" smtClean="0"/>
-              <a:t>1/23/2022</a:t>
+              <a:t>1/24/2022</a:t>
             </a:fld>
             <a:endParaRPr lang="en-US" dirty="0"/>
           </a:p>
@@ -44359,7 +45319,7 @@
           <a:p>
             <a:fld id="{1D10089C-A521-4DD8-8C2F-F1136A3C80BD}" type="datetime1">
               <a:rPr lang="en-US" smtClean="0"/>
-              <a:t>1/23/2022</a:t>
+              <a:t>1/24/2022</a:t>
             </a:fld>
             <a:endParaRPr lang="en-US" dirty="0"/>
           </a:p>
@@ -44650,7 +45610,7 @@
           <a:p>
             <a:fld id="{DAB5D9C6-B34D-43D8-9E4F-1282694CB653}" type="datetime1">
               <a:rPr lang="en-US" smtClean="0"/>
-              <a:t>1/23/2022</a:t>
+              <a:t>1/24/2022</a:t>
             </a:fld>
             <a:endParaRPr lang="en-US" dirty="0"/>
           </a:p>
@@ -44895,7 +45855,7 @@
           <a:p>
             <a:fld id="{CD4C00DD-07A2-4DC7-B463-BADC4CE40A75}" type="datetime1">
               <a:rPr lang="en-US" smtClean="0"/>
-              <a:t>1/23/2022</a:t>
+              <a:t>1/24/2022</a:t>
             </a:fld>
             <a:endParaRPr lang="en-US" dirty="0"/>
           </a:p>
@@ -45489,13 +46449,13 @@
   <p:clrMapOvr>
     <a:masterClrMapping/>
   </p:clrMapOvr>
-  <mc:AlternateContent xmlns:mc="http://schemas.openxmlformats.org/markup-compatibility/2006">
-    <mc:Choice xmlns:p159="http://schemas.microsoft.com/office/powerpoint/2015/09/main" Requires="p159">
+  <mc:AlternateContent xmlns:mc="http://schemas.openxmlformats.org/markup-compatibility/2006" xmlns:p159="http://schemas.microsoft.com/office/powerpoint/2015/09/main">
+    <mc:Choice Requires="p159">
       <p:transition spd="slow">
         <p159:morph option="byObject"/>
       </p:transition>
     </mc:Choice>
-    <mc:Fallback>
+    <mc:Fallback xmlns="">
       <p:transition spd="slow">
         <p:fade/>
       </p:transition>
@@ -45879,13 +46839,13 @@
   <p:clrMapOvr>
     <a:masterClrMapping/>
   </p:clrMapOvr>
-  <mc:AlternateContent xmlns:mc="http://schemas.openxmlformats.org/markup-compatibility/2006">
-    <mc:Choice xmlns:p159="http://schemas.microsoft.com/office/powerpoint/2015/09/main" Requires="p159">
+  <mc:AlternateContent xmlns:mc="http://schemas.openxmlformats.org/markup-compatibility/2006" xmlns:p159="http://schemas.microsoft.com/office/powerpoint/2015/09/main">
+    <mc:Choice Requires="p159">
       <p:transition spd="slow">
         <p159:morph option="byObject"/>
       </p:transition>
     </mc:Choice>
-    <mc:Fallback>
+    <mc:Fallback xmlns="">
       <p:transition spd="slow">
         <p:fade/>
       </p:transition>
@@ -46267,13 +47227,13 @@
   <p:clrMapOvr>
     <a:masterClrMapping/>
   </p:clrMapOvr>
-  <mc:AlternateContent xmlns:mc="http://schemas.openxmlformats.org/markup-compatibility/2006">
-    <mc:Choice xmlns:p159="http://schemas.microsoft.com/office/powerpoint/2015/09/main" Requires="p159">
+  <mc:AlternateContent xmlns:mc="http://schemas.openxmlformats.org/markup-compatibility/2006" xmlns:p159="http://schemas.microsoft.com/office/powerpoint/2015/09/main">
+    <mc:Choice Requires="p159">
       <p:transition spd="slow">
         <p159:morph option="byObject"/>
       </p:transition>
     </mc:Choice>
-    <mc:Fallback>
+    <mc:Fallback xmlns="">
       <p:transition spd="slow">
         <p:fade/>
       </p:transition>
@@ -46602,13 +47562,13 @@
   <p:clrMapOvr>
     <a:masterClrMapping/>
   </p:clrMapOvr>
-  <mc:AlternateContent xmlns:mc="http://schemas.openxmlformats.org/markup-compatibility/2006">
-    <mc:Choice xmlns:p159="http://schemas.microsoft.com/office/powerpoint/2015/09/main" Requires="p159">
+  <mc:AlternateContent xmlns:mc="http://schemas.openxmlformats.org/markup-compatibility/2006" xmlns:p159="http://schemas.microsoft.com/office/powerpoint/2015/09/main">
+    <mc:Choice Requires="p159">
       <p:transition spd="slow">
         <p159:morph option="byObject"/>
       </p:transition>
     </mc:Choice>
-    <mc:Fallback>
+    <mc:Fallback xmlns="">
       <p:transition spd="slow">
         <p:fade/>
       </p:transition>
@@ -47065,13 +48025,13 @@
   <p:clrMapOvr>
     <a:masterClrMapping/>
   </p:clrMapOvr>
-  <mc:AlternateContent xmlns:mc="http://schemas.openxmlformats.org/markup-compatibility/2006">
-    <mc:Choice xmlns:p159="http://schemas.microsoft.com/office/powerpoint/2015/09/main" Requires="p159">
+  <mc:AlternateContent xmlns:mc="http://schemas.openxmlformats.org/markup-compatibility/2006" xmlns:p159="http://schemas.microsoft.com/office/powerpoint/2015/09/main">
+    <mc:Choice Requires="p159">
       <p:transition spd="slow">
         <p159:morph option="byObject"/>
       </p:transition>
     </mc:Choice>
-    <mc:Fallback>
+    <mc:Fallback xmlns="">
       <p:transition spd="slow">
         <p:fade/>
       </p:transition>
@@ -47528,13 +48488,13 @@
   <p:clrMapOvr>
     <a:masterClrMapping/>
   </p:clrMapOvr>
-  <mc:AlternateContent xmlns:mc="http://schemas.openxmlformats.org/markup-compatibility/2006">
-    <mc:Choice xmlns:p159="http://schemas.microsoft.com/office/powerpoint/2015/09/main" Requires="p159">
+  <mc:AlternateContent xmlns:mc="http://schemas.openxmlformats.org/markup-compatibility/2006" xmlns:p159="http://schemas.microsoft.com/office/powerpoint/2015/09/main">
+    <mc:Choice Requires="p159">
       <p:transition spd="slow">
         <p159:morph option="byObject"/>
       </p:transition>
     </mc:Choice>
-    <mc:Fallback>
+    <mc:Fallback xmlns="">
       <p:transition spd="slow">
         <p:fade/>
       </p:transition>
@@ -47991,13 +48951,13 @@
   <p:clrMapOvr>
     <a:masterClrMapping/>
   </p:clrMapOvr>
-  <mc:AlternateContent xmlns:mc="http://schemas.openxmlformats.org/markup-compatibility/2006">
-    <mc:Choice xmlns:p159="http://schemas.microsoft.com/office/powerpoint/2015/09/main" Requires="p159">
+  <mc:AlternateContent xmlns:mc="http://schemas.openxmlformats.org/markup-compatibility/2006" xmlns:p159="http://schemas.microsoft.com/office/powerpoint/2015/09/main">
+    <mc:Choice Requires="p159">
       <p:transition spd="slow">
         <p159:morph option="byObject"/>
       </p:transition>
     </mc:Choice>
-    <mc:Fallback>
+    <mc:Fallback xmlns="">
       <p:transition spd="slow">
         <p:fade/>
       </p:transition>
@@ -48353,13 +49313,13 @@
   <p:clrMapOvr>
     <a:masterClrMapping/>
   </p:clrMapOvr>
-  <mc:AlternateContent xmlns:mc="http://schemas.openxmlformats.org/markup-compatibility/2006">
-    <mc:Choice xmlns:p159="http://schemas.microsoft.com/office/powerpoint/2015/09/main" Requires="p159">
+  <mc:AlternateContent xmlns:mc="http://schemas.openxmlformats.org/markup-compatibility/2006" xmlns:p159="http://schemas.microsoft.com/office/powerpoint/2015/09/main">
+    <mc:Choice Requires="p159">
       <p:transition spd="slow">
         <p159:morph option="byObject"/>
       </p:transition>
     </mc:Choice>
-    <mc:Fallback>
+    <mc:Fallback xmlns="">
       <p:transition spd="slow">
         <p:fade/>
       </p:transition>
@@ -48746,13 +49706,13 @@
   <p:clrMapOvr>
     <a:masterClrMapping/>
   </p:clrMapOvr>
-  <mc:AlternateContent xmlns:mc="http://schemas.openxmlformats.org/markup-compatibility/2006">
-    <mc:Choice xmlns:p159="http://schemas.microsoft.com/office/powerpoint/2015/09/main" Requires="p159">
+  <mc:AlternateContent xmlns:mc="http://schemas.openxmlformats.org/markup-compatibility/2006" xmlns:p159="http://schemas.microsoft.com/office/powerpoint/2015/09/main">
+    <mc:Choice Requires="p159">
       <p:transition spd="slow">
         <p159:morph option="byObject"/>
       </p:transition>
     </mc:Choice>
-    <mc:Fallback>
+    <mc:Fallback xmlns="">
       <p:transition spd="slow">
         <p:fade/>
       </p:transition>
@@ -49139,13 +50099,13 @@
   <p:clrMapOvr>
     <a:masterClrMapping/>
   </p:clrMapOvr>
-  <mc:AlternateContent xmlns:mc="http://schemas.openxmlformats.org/markup-compatibility/2006">
-    <mc:Choice xmlns:p159="http://schemas.microsoft.com/office/powerpoint/2015/09/main" Requires="p159">
+  <mc:AlternateContent xmlns:mc="http://schemas.openxmlformats.org/markup-compatibility/2006" xmlns:p159="http://schemas.microsoft.com/office/powerpoint/2015/09/main">
+    <mc:Choice Requires="p159">
       <p:transition spd="slow">
         <p159:morph option="byObject"/>
       </p:transition>
     </mc:Choice>
-    <mc:Fallback>
+    <mc:Fallback xmlns="">
       <p:transition spd="slow">
         <p:fade/>
       </p:transition>
@@ -49535,13 +50495,13 @@
   <p:clrMapOvr>
     <a:masterClrMapping/>
   </p:clrMapOvr>
-  <mc:AlternateContent xmlns:mc="http://schemas.openxmlformats.org/markup-compatibility/2006">
-    <mc:Choice xmlns:p159="http://schemas.microsoft.com/office/powerpoint/2015/09/main" Requires="p159">
+  <mc:AlternateContent xmlns:mc="http://schemas.openxmlformats.org/markup-compatibility/2006" xmlns:p159="http://schemas.microsoft.com/office/powerpoint/2015/09/main">
+    <mc:Choice Requires="p159">
       <p:transition spd="slow">
         <p159:morph option="byObject"/>
       </p:transition>
     </mc:Choice>
-    <mc:Fallback>
+    <mc:Fallback xmlns="">
       <p:transition spd="slow">
         <p:fade/>
       </p:transition>
@@ -49859,13 +50819,13 @@
   <p:clrMapOvr>
     <a:masterClrMapping/>
   </p:clrMapOvr>
-  <mc:AlternateContent xmlns:mc="http://schemas.openxmlformats.org/markup-compatibility/2006">
-    <mc:Choice xmlns:p159="http://schemas.microsoft.com/office/powerpoint/2015/09/main" Requires="p159">
+  <mc:AlternateContent xmlns:mc="http://schemas.openxmlformats.org/markup-compatibility/2006" xmlns:p159="http://schemas.microsoft.com/office/powerpoint/2015/09/main">
+    <mc:Choice Requires="p159">
       <p:transition spd="slow">
         <p159:morph option="byObject"/>
       </p:transition>
     </mc:Choice>
-    <mc:Fallback>
+    <mc:Fallback xmlns="">
       <p:transition spd="slow">
         <p:fade/>
       </p:transition>
@@ -50859,13 +51819,13 @@
   <p:clrMapOvr>
     <a:masterClrMapping/>
   </p:clrMapOvr>
-  <mc:AlternateContent xmlns:mc="http://schemas.openxmlformats.org/markup-compatibility/2006">
-    <mc:Choice xmlns:p159="http://schemas.microsoft.com/office/powerpoint/2015/09/main" Requires="p159">
+  <mc:AlternateContent xmlns:mc="http://schemas.openxmlformats.org/markup-compatibility/2006" xmlns:p159="http://schemas.microsoft.com/office/powerpoint/2015/09/main">
+    <mc:Choice Requires="p159">
       <p:transition spd="slow">
         <p159:morph option="byObject"/>
       </p:transition>
     </mc:Choice>
-    <mc:Fallback>
+    <mc:Fallback xmlns="">
       <p:transition spd="slow">
         <p:fade/>
       </p:transition>
@@ -51796,13 +52756,13 @@
   <p:clrMapOvr>
     <a:masterClrMapping/>
   </p:clrMapOvr>
-  <mc:AlternateContent xmlns:mc="http://schemas.openxmlformats.org/markup-compatibility/2006">
-    <mc:Choice xmlns:p159="http://schemas.microsoft.com/office/powerpoint/2015/09/main" Requires="p159">
+  <mc:AlternateContent xmlns:mc="http://schemas.openxmlformats.org/markup-compatibility/2006" xmlns:p159="http://schemas.microsoft.com/office/powerpoint/2015/09/main">
+    <mc:Choice Requires="p159">
       <p:transition spd="slow">
         <p159:morph option="byObject"/>
       </p:transition>
     </mc:Choice>
-    <mc:Fallback>
+    <mc:Fallback xmlns="">
       <p:transition spd="slow">
         <p:fade/>
       </p:transition>
@@ -52305,13 +53265,13 @@
   <p:clrMapOvr>
     <a:masterClrMapping/>
   </p:clrMapOvr>
-  <mc:AlternateContent xmlns:mc="http://schemas.openxmlformats.org/markup-compatibility/2006">
-    <mc:Choice xmlns:p159="http://schemas.microsoft.com/office/powerpoint/2015/09/main" Requires="p159">
+  <mc:AlternateContent xmlns:mc="http://schemas.openxmlformats.org/markup-compatibility/2006" xmlns:p159="http://schemas.microsoft.com/office/powerpoint/2015/09/main">
+    <mc:Choice Requires="p159">
       <p:transition spd="slow">
         <p159:morph option="byObject"/>
       </p:transition>
     </mc:Choice>
-    <mc:Fallback>
+    <mc:Fallback xmlns="">
       <p:transition spd="slow">
         <p:fade/>
       </p:transition>
@@ -52852,13 +53812,13 @@
   <p:clrMapOvr>
     <a:masterClrMapping/>
   </p:clrMapOvr>
-  <mc:AlternateContent xmlns:mc="http://schemas.openxmlformats.org/markup-compatibility/2006">
-    <mc:Choice xmlns:p159="http://schemas.microsoft.com/office/powerpoint/2015/09/main" Requires="p159">
+  <mc:AlternateContent xmlns:mc="http://schemas.openxmlformats.org/markup-compatibility/2006" xmlns:p159="http://schemas.microsoft.com/office/powerpoint/2015/09/main">
+    <mc:Choice Requires="p159">
       <p:transition spd="slow">
         <p159:morph option="byObject"/>
       </p:transition>
     </mc:Choice>
-    <mc:Fallback>
+    <mc:Fallback xmlns="">
       <p:transition spd="slow">
         <p:fade/>
       </p:transition>
@@ -53404,13 +54364,13 @@
   <p:clrMapOvr>
     <a:masterClrMapping/>
   </p:clrMapOvr>
-  <mc:AlternateContent xmlns:mc="http://schemas.openxmlformats.org/markup-compatibility/2006">
-    <mc:Choice xmlns:p159="http://schemas.microsoft.com/office/powerpoint/2015/09/main" Requires="p159">
+  <mc:AlternateContent xmlns:mc="http://schemas.openxmlformats.org/markup-compatibility/2006" xmlns:p159="http://schemas.microsoft.com/office/powerpoint/2015/09/main">
+    <mc:Choice Requires="p159">
       <p:transition spd="slow">
         <p159:morph option="byObject"/>
       </p:transition>
     </mc:Choice>
-    <mc:Fallback>
+    <mc:Fallback xmlns="">
       <p:transition spd="slow">
         <p:fade/>
       </p:transition>
@@ -53610,13 +54570,13 @@
   <p:clrMapOvr>
     <a:masterClrMapping/>
   </p:clrMapOvr>
-  <mc:AlternateContent xmlns:mc="http://schemas.openxmlformats.org/markup-compatibility/2006">
-    <mc:Choice xmlns:p159="http://schemas.microsoft.com/office/powerpoint/2015/09/main" Requires="p159">
+  <mc:AlternateContent xmlns:mc="http://schemas.openxmlformats.org/markup-compatibility/2006" xmlns:p159="http://schemas.microsoft.com/office/powerpoint/2015/09/main">
+    <mc:Choice Requires="p159">
       <p:transition spd="slow">
         <p159:morph option="byObject"/>
       </p:transition>
     </mc:Choice>
-    <mc:Fallback>
+    <mc:Fallback xmlns="">
       <p:transition spd="slow">
         <p:fade/>
       </p:transition>
@@ -53900,13 +54860,13 @@
   <p:clrMapOvr>
     <a:masterClrMapping/>
   </p:clrMapOvr>
-  <mc:AlternateContent xmlns:mc="http://schemas.openxmlformats.org/markup-compatibility/2006">
-    <mc:Choice xmlns:p159="http://schemas.microsoft.com/office/powerpoint/2015/09/main" Requires="p159">
+  <mc:AlternateContent xmlns:mc="http://schemas.openxmlformats.org/markup-compatibility/2006" xmlns:p159="http://schemas.microsoft.com/office/powerpoint/2015/09/main">
+    <mc:Choice Requires="p159">
       <p:transition spd="slow">
         <p159:morph option="byObject"/>
       </p:transition>
     </mc:Choice>
-    <mc:Fallback>
+    <mc:Fallback xmlns="">
       <p:transition spd="slow">
         <p:fade/>
       </p:transition>
@@ -54286,13 +55246,13 @@
   <p:clrMapOvr>
     <a:masterClrMapping/>
   </p:clrMapOvr>
-  <mc:AlternateContent xmlns:mc="http://schemas.openxmlformats.org/markup-compatibility/2006">
-    <mc:Choice xmlns:p159="http://schemas.microsoft.com/office/powerpoint/2015/09/main" Requires="p159">
+  <mc:AlternateContent xmlns:mc="http://schemas.openxmlformats.org/markup-compatibility/2006" xmlns:p159="http://schemas.microsoft.com/office/powerpoint/2015/09/main">
+    <mc:Choice Requires="p159">
       <p:transition spd="slow">
         <p159:morph option="byObject"/>
       </p:transition>
     </mc:Choice>
-    <mc:Fallback>
+    <mc:Fallback xmlns="">
       <p:transition spd="slow">
         <p:fade/>
       </p:transition>
@@ -54672,13 +55632,13 @@
   <p:clrMapOvr>
     <a:masterClrMapping/>
   </p:clrMapOvr>
-  <mc:AlternateContent xmlns:mc="http://schemas.openxmlformats.org/markup-compatibility/2006">
-    <mc:Choice xmlns:p159="http://schemas.microsoft.com/office/powerpoint/2015/09/main" Requires="p159">
+  <mc:AlternateContent xmlns:mc="http://schemas.openxmlformats.org/markup-compatibility/2006" xmlns:p159="http://schemas.microsoft.com/office/powerpoint/2015/09/main">
+    <mc:Choice Requires="p159">
       <p:transition spd="slow">
         <p159:morph option="byObject"/>
       </p:transition>
     </mc:Choice>
-    <mc:Fallback>
+    <mc:Fallback xmlns="">
       <p:transition spd="slow">
         <p:fade/>
       </p:transition>
@@ -55015,13 +55975,13 @@
   <p:clrMapOvr>
     <a:masterClrMapping/>
   </p:clrMapOvr>
-  <mc:AlternateContent xmlns:mc="http://schemas.openxmlformats.org/markup-compatibility/2006">
-    <mc:Choice xmlns:p159="http://schemas.microsoft.com/office/powerpoint/2015/09/main" Requires="p159">
+  <mc:AlternateContent xmlns:mc="http://schemas.openxmlformats.org/markup-compatibility/2006" xmlns:p159="http://schemas.microsoft.com/office/powerpoint/2015/09/main">
+    <mc:Choice Requires="p159">
       <p:transition spd="slow">
         <p159:morph option="byObject"/>
       </p:transition>
     </mc:Choice>
-    <mc:Fallback>
+    <mc:Fallback xmlns="">
       <p:transition spd="slow">
         <p:fade/>
       </p:transition>
@@ -55306,13 +56266,13 @@
   <p:clrMapOvr>
     <a:masterClrMapping/>
   </p:clrMapOvr>
-  <mc:AlternateContent xmlns:mc="http://schemas.openxmlformats.org/markup-compatibility/2006">
-    <mc:Choice xmlns:p159="http://schemas.microsoft.com/office/powerpoint/2015/09/main" Requires="p159">
+  <mc:AlternateContent xmlns:mc="http://schemas.openxmlformats.org/markup-compatibility/2006" xmlns:p159="http://schemas.microsoft.com/office/powerpoint/2015/09/main">
+    <mc:Choice Requires="p159">
       <p:transition spd="slow">
         <p159:morph option="byObject"/>
       </p:transition>
     </mc:Choice>
-    <mc:Fallback>
+    <mc:Fallback xmlns="">
       <p:transition spd="slow">
         <p:fade/>
       </p:transition>
@@ -55714,13 +56674,13 @@
   <p:clrMapOvr>
     <a:masterClrMapping/>
   </p:clrMapOvr>
-  <mc:AlternateContent xmlns:mc="http://schemas.openxmlformats.org/markup-compatibility/2006">
-    <mc:Choice xmlns:p159="http://schemas.microsoft.com/office/powerpoint/2015/09/main" Requires="p159">
+  <mc:AlternateContent xmlns:mc="http://schemas.openxmlformats.org/markup-compatibility/2006" xmlns:p159="http://schemas.microsoft.com/office/powerpoint/2015/09/main">
+    <mc:Choice Requires="p159">
       <p:transition spd="slow">
         <p159:morph option="byObject"/>
       </p:transition>
     </mc:Choice>
-    <mc:Fallback>
+    <mc:Fallback xmlns="">
       <p:transition spd="slow">
         <p:fade/>
       </p:transition>
@@ -56163,13 +57123,13 @@
   <p:clrMapOvr>
     <a:masterClrMapping/>
   </p:clrMapOvr>
-  <mc:AlternateContent xmlns:mc="http://schemas.openxmlformats.org/markup-compatibility/2006">
-    <mc:Choice xmlns:p159="http://schemas.microsoft.com/office/powerpoint/2015/09/main" Requires="p159">
+  <mc:AlternateContent xmlns:mc="http://schemas.openxmlformats.org/markup-compatibility/2006" xmlns:p159="http://schemas.microsoft.com/office/powerpoint/2015/09/main">
+    <mc:Choice Requires="p159">
       <p:transition spd="slow">
         <p159:morph option="byObject"/>
       </p:transition>
     </mc:Choice>
-    <mc:Fallback>
+    <mc:Fallback xmlns="">
       <p:transition spd="slow">
         <p:fade/>
       </p:transition>

</xml_diff>

<commit_message>
Min Teil vertig gmacht
und no paar sache korrigiert ide Präsi
</commit_message>
<xml_diff>
--- a/Praesentation/Steinschlagrisiko_Präsentation.pptx
+++ b/Praesentation/Steinschlagrisiko_Präsentation.pptx
@@ -11830,7 +11830,7 @@
           </a:r>
           <a:r>
             <a:rPr lang="de-DE" dirty="0"/>
-            <a:t> ist von Steinschläge betroffen</a:t>
+            <a:t> ist von Steinschlägen betroffen</a:t>
           </a:r>
           <a:endParaRPr lang="en-US" dirty="0"/>
         </a:p>
@@ -11944,7 +11944,7 @@
         <a:p>
           <a:r>
             <a:rPr lang="de-DE" dirty="0"/>
-            <a:t>Jährliche Todeswahrscheinlichkeit</a:t>
+            <a:t>Jährliche Todeswahrscheinlichkeit berechnen</a:t>
           </a:r>
           <a:endParaRPr lang="en-US" dirty="0"/>
         </a:p>
@@ -12408,9 +12408,9 @@
   <dgm:cxnLst>
     <dgm:cxn modelId="{8760E50B-6BA4-434D-9E8F-243EFDCDD694}" srcId="{9DD1A594-42BA-4C61-B647-830D5FDFC715}" destId="{093D8F60-BD75-438C-876E-3A16A628DF40}" srcOrd="3" destOrd="0" parTransId="{C0B67558-C3BA-40FC-9E5B-72E1A5AC7011}" sibTransId="{E834EBEF-9AA3-4E01-80F9-9879FA2349C5}"/>
     <dgm:cxn modelId="{A010B134-3347-469C-B110-E4A756F91437}" srcId="{9DD1A594-42BA-4C61-B647-830D5FDFC715}" destId="{6845A5CF-ABF5-41FE-9CD8-3742542A0037}" srcOrd="2" destOrd="0" parTransId="{B5F0028E-E56F-4F7A-88BE-A063CA75E1EB}" sibTransId="{B1E96187-1758-44B7-8709-F2E31628140F}"/>
-    <dgm:cxn modelId="{70EB9E5B-4378-4851-829D-20DE666D67EC}" type="presOf" srcId="{6845A5CF-ABF5-41FE-9CD8-3742542A0037}" destId="{EF38EC58-EAE3-4E45-B979-EE70948D098E}" srcOrd="0" destOrd="0" presId="urn:microsoft.com/office/officeart/2005/8/layout/vList2"/>
     <dgm:cxn modelId="{CBC16548-3D8E-4E35-A796-187A3AB24A61}" srcId="{9DD1A594-42BA-4C61-B647-830D5FDFC715}" destId="{18E5233E-0C70-4C8A-A535-F0B7EF185F4C}" srcOrd="1" destOrd="0" parTransId="{BBC6015B-AF29-409E-A191-58E8FA4D0A70}" sibTransId="{BFAF086A-9417-451F-957A-231B42892705}"/>
     <dgm:cxn modelId="{1B897758-FFF4-41AA-BEFE-08EF016E064D}" type="presOf" srcId="{9DD1A594-42BA-4C61-B647-830D5FDFC715}" destId="{BEB3585F-CCB8-4FAC-9902-ED6487167A0B}" srcOrd="0" destOrd="0" presId="urn:microsoft.com/office/officeart/2005/8/layout/vList2"/>
+    <dgm:cxn modelId="{70EB9E5B-4378-4851-829D-20DE666D67EC}" type="presOf" srcId="{6845A5CF-ABF5-41FE-9CD8-3742542A0037}" destId="{EF38EC58-EAE3-4E45-B979-EE70948D098E}" srcOrd="0" destOrd="0" presId="urn:microsoft.com/office/officeart/2005/8/layout/vList2"/>
     <dgm:cxn modelId="{261A058F-7D5B-431E-99EE-82359ACAD0BB}" type="presOf" srcId="{093D8F60-BD75-438C-876E-3A16A628DF40}" destId="{8283B7CD-F4F4-4288-8E43-D86EDC2CA997}" srcOrd="0" destOrd="0" presId="urn:microsoft.com/office/officeart/2005/8/layout/vList2"/>
     <dgm:cxn modelId="{9796D2BC-959A-489D-8489-799BB660A9A9}" srcId="{9DD1A594-42BA-4C61-B647-830D5FDFC715}" destId="{FC0FCCC8-0FAF-4285-BE50-D67D2E21F62B}" srcOrd="0" destOrd="0" parTransId="{9BC2BD98-D4A9-47C7-95FA-B9CD7541486D}" sibTransId="{36D6FE8A-0C4C-4C3E-A9F0-D644AEB3E77B}"/>
     <dgm:cxn modelId="{D7FDD8C0-A954-4549-8AD2-25B38A5EA393}" type="presOf" srcId="{FC0FCCC8-0FAF-4285-BE50-D67D2E21F62B}" destId="{D945287C-34F7-49AE-89E2-FBAFEA849270}" srcOrd="0" destOrd="0" presId="urn:microsoft.com/office/officeart/2005/8/layout/vList2"/>
@@ -12492,7 +12492,7 @@
         <a:p>
           <a:r>
             <a:rPr lang="de-CH" dirty="0"/>
-            <a:t>Nach kumulierter Zeitabstand sortieren</a:t>
+            <a:t>Nach kumuliertem Zeitabstand sortieren</a:t>
           </a:r>
           <a:endParaRPr lang="de-CH" noProof="0" dirty="0"/>
         </a:p>
@@ -12612,7 +12612,7 @@
             <a:rPr lang="de-CH" dirty="0">
               <a:sym typeface="Wingdings" panose="05000000000000000000" pitchFamily="2" charset="2"/>
             </a:rPr>
-            <a:t>Jahre simulierte: 135’920</a:t>
+            <a:t>Jahre simuliert: 135’920</a:t>
           </a:r>
         </a:p>
       </dgm:t>
@@ -12651,10 +12651,10 @@
             <a:buChar char="•"/>
           </a:pPr>
           <a:r>
-            <a:rPr lang="de-CH">
+            <a:rPr lang="de-CH" dirty="0">
               <a:sym typeface="Wingdings" panose="05000000000000000000" pitchFamily="2" charset="2"/>
             </a:rPr>
-            <a:t>Differenz der kumulierten Zeitabstand</a:t>
+            <a:t>Differenz der kumulierten Zeitabstände</a:t>
           </a:r>
           <a:endParaRPr lang="de-CH" noProof="0" dirty="0"/>
         </a:p>
@@ -12772,9 +12772,9 @@
     <dgm:cxn modelId="{A74F740E-75F5-457C-822E-F368CBC76214}" srcId="{9DD1A594-42BA-4C61-B647-830D5FDFC715}" destId="{4C186E30-4709-4FB4-B209-0E5229D727CC}" srcOrd="3" destOrd="0" parTransId="{E4D9D86E-05A6-4244-B1C7-351F9A1113D9}" sibTransId="{D640AA43-2D8A-472A-9455-376DC52B6E94}"/>
     <dgm:cxn modelId="{F77EDD18-836F-4383-B21D-850A2C4949C4}" type="presOf" srcId="{01630BA7-BEEA-47E0-88BC-50201DC3038D}" destId="{F62BD93B-A959-4440-A963-A8627BA00630}" srcOrd="0" destOrd="0" presId="urn:microsoft.com/office/officeart/2005/8/layout/vList2"/>
     <dgm:cxn modelId="{A010B134-3347-469C-B110-E4A756F91437}" srcId="{9DD1A594-42BA-4C61-B647-830D5FDFC715}" destId="{6845A5CF-ABF5-41FE-9CD8-3742542A0037}" srcOrd="2" destOrd="0" parTransId="{B5F0028E-E56F-4F7A-88BE-A063CA75E1EB}" sibTransId="{B1E96187-1758-44B7-8709-F2E31628140F}"/>
-    <dgm:cxn modelId="{70EB9E5B-4378-4851-829D-20DE666D67EC}" type="presOf" srcId="{6845A5CF-ABF5-41FE-9CD8-3742542A0037}" destId="{EF38EC58-EAE3-4E45-B979-EE70948D098E}" srcOrd="0" destOrd="0" presId="urn:microsoft.com/office/officeart/2005/8/layout/vList2"/>
     <dgm:cxn modelId="{CBC16548-3D8E-4E35-A796-187A3AB24A61}" srcId="{9DD1A594-42BA-4C61-B647-830D5FDFC715}" destId="{18E5233E-0C70-4C8A-A535-F0B7EF185F4C}" srcOrd="1" destOrd="0" parTransId="{BBC6015B-AF29-409E-A191-58E8FA4D0A70}" sibTransId="{BFAF086A-9417-451F-957A-231B42892705}"/>
     <dgm:cxn modelId="{1B897758-FFF4-41AA-BEFE-08EF016E064D}" type="presOf" srcId="{9DD1A594-42BA-4C61-B647-830D5FDFC715}" destId="{BEB3585F-CCB8-4FAC-9902-ED6487167A0B}" srcOrd="0" destOrd="0" presId="urn:microsoft.com/office/officeart/2005/8/layout/vList2"/>
+    <dgm:cxn modelId="{70EB9E5B-4378-4851-829D-20DE666D67EC}" type="presOf" srcId="{6845A5CF-ABF5-41FE-9CD8-3742542A0037}" destId="{EF38EC58-EAE3-4E45-B979-EE70948D098E}" srcOrd="0" destOrd="0" presId="urn:microsoft.com/office/officeart/2005/8/layout/vList2"/>
     <dgm:cxn modelId="{261A058F-7D5B-431E-99EE-82359ACAD0BB}" type="presOf" srcId="{093D8F60-BD75-438C-876E-3A16A628DF40}" destId="{8283B7CD-F4F4-4288-8E43-D86EDC2CA997}" srcOrd="0" destOrd="0" presId="urn:microsoft.com/office/officeart/2005/8/layout/vList2"/>
     <dgm:cxn modelId="{94FB20A0-F480-4159-8226-4E0AA41E74D9}" srcId="{9DD1A594-42BA-4C61-B647-830D5FDFC715}" destId="{01630BA7-BEEA-47E0-88BC-50201DC3038D}" srcOrd="5" destOrd="0" parTransId="{9C8840FD-DE49-4895-A3A8-6C8C1B4E3290}" sibTransId="{3AFFEAFF-E0A0-4B59-AA47-ADB7F0530A5E}"/>
     <dgm:cxn modelId="{9796D2BC-959A-489D-8489-799BB660A9A9}" srcId="{9DD1A594-42BA-4C61-B647-830D5FDFC715}" destId="{FC0FCCC8-0FAF-4285-BE50-D67D2E21F62B}" srcOrd="0" destOrd="0" parTransId="{9BC2BD98-D4A9-47C7-95FA-B9CD7541486D}" sibTransId="{36D6FE8A-0C4C-4C3E-A9F0-D644AEB3E77B}"/>
@@ -15054,9 +15054,9 @@
   </dgm:ptLst>
   <dgm:cxnLst>
     <dgm:cxn modelId="{A010B134-3347-469C-B110-E4A756F91437}" srcId="{9DD1A594-42BA-4C61-B647-830D5FDFC715}" destId="{6845A5CF-ABF5-41FE-9CD8-3742542A0037}" srcOrd="2" destOrd="0" parTransId="{B5F0028E-E56F-4F7A-88BE-A063CA75E1EB}" sibTransId="{B1E96187-1758-44B7-8709-F2E31628140F}"/>
-    <dgm:cxn modelId="{70EB9E5B-4378-4851-829D-20DE666D67EC}" type="presOf" srcId="{6845A5CF-ABF5-41FE-9CD8-3742542A0037}" destId="{EF38EC58-EAE3-4E45-B979-EE70948D098E}" srcOrd="0" destOrd="0" presId="urn:microsoft.com/office/officeart/2005/8/layout/vList2"/>
     <dgm:cxn modelId="{CBC16548-3D8E-4E35-A796-187A3AB24A61}" srcId="{9DD1A594-42BA-4C61-B647-830D5FDFC715}" destId="{18E5233E-0C70-4C8A-A535-F0B7EF185F4C}" srcOrd="1" destOrd="0" parTransId="{BBC6015B-AF29-409E-A191-58E8FA4D0A70}" sibTransId="{BFAF086A-9417-451F-957A-231B42892705}"/>
     <dgm:cxn modelId="{1B897758-FFF4-41AA-BEFE-08EF016E064D}" type="presOf" srcId="{9DD1A594-42BA-4C61-B647-830D5FDFC715}" destId="{BEB3585F-CCB8-4FAC-9902-ED6487167A0B}" srcOrd="0" destOrd="0" presId="urn:microsoft.com/office/officeart/2005/8/layout/vList2"/>
+    <dgm:cxn modelId="{70EB9E5B-4378-4851-829D-20DE666D67EC}" type="presOf" srcId="{6845A5CF-ABF5-41FE-9CD8-3742542A0037}" destId="{EF38EC58-EAE3-4E45-B979-EE70948D098E}" srcOrd="0" destOrd="0" presId="urn:microsoft.com/office/officeart/2005/8/layout/vList2"/>
     <dgm:cxn modelId="{9796D2BC-959A-489D-8489-799BB660A9A9}" srcId="{9DD1A594-42BA-4C61-B647-830D5FDFC715}" destId="{FC0FCCC8-0FAF-4285-BE50-D67D2E21F62B}" srcOrd="0" destOrd="0" parTransId="{9BC2BD98-D4A9-47C7-95FA-B9CD7541486D}" sibTransId="{36D6FE8A-0C4C-4C3E-A9F0-D644AEB3E77B}"/>
     <dgm:cxn modelId="{D7FDD8C0-A954-4549-8AD2-25B38A5EA393}" type="presOf" srcId="{FC0FCCC8-0FAF-4285-BE50-D67D2E21F62B}" destId="{D945287C-34F7-49AE-89E2-FBAFEA849270}" srcOrd="0" destOrd="0" presId="urn:microsoft.com/office/officeart/2005/8/layout/vList2"/>
     <dgm:cxn modelId="{01A4C3CF-4477-47EA-AA0F-E2E5650C023F}" type="presOf" srcId="{18E5233E-0C70-4C8A-A535-F0B7EF185F4C}" destId="{16031EB5-B022-4F56-901F-7F71F4570837}" srcOrd="0" destOrd="0" presId="urn:microsoft.com/office/officeart/2005/8/layout/vList2"/>
@@ -15251,9 +15251,9 @@
   </dgm:ptLst>
   <dgm:cxnLst>
     <dgm:cxn modelId="{A010B134-3347-469C-B110-E4A756F91437}" srcId="{9DD1A594-42BA-4C61-B647-830D5FDFC715}" destId="{6845A5CF-ABF5-41FE-9CD8-3742542A0037}" srcOrd="2" destOrd="0" parTransId="{B5F0028E-E56F-4F7A-88BE-A063CA75E1EB}" sibTransId="{B1E96187-1758-44B7-8709-F2E31628140F}"/>
-    <dgm:cxn modelId="{70EB9E5B-4378-4851-829D-20DE666D67EC}" type="presOf" srcId="{6845A5CF-ABF5-41FE-9CD8-3742542A0037}" destId="{EF38EC58-EAE3-4E45-B979-EE70948D098E}" srcOrd="0" destOrd="0" presId="urn:microsoft.com/office/officeart/2005/8/layout/vList2"/>
     <dgm:cxn modelId="{CBC16548-3D8E-4E35-A796-187A3AB24A61}" srcId="{9DD1A594-42BA-4C61-B647-830D5FDFC715}" destId="{18E5233E-0C70-4C8A-A535-F0B7EF185F4C}" srcOrd="1" destOrd="0" parTransId="{BBC6015B-AF29-409E-A191-58E8FA4D0A70}" sibTransId="{BFAF086A-9417-451F-957A-231B42892705}"/>
     <dgm:cxn modelId="{1B897758-FFF4-41AA-BEFE-08EF016E064D}" type="presOf" srcId="{9DD1A594-42BA-4C61-B647-830D5FDFC715}" destId="{BEB3585F-CCB8-4FAC-9902-ED6487167A0B}" srcOrd="0" destOrd="0" presId="urn:microsoft.com/office/officeart/2005/8/layout/vList2"/>
+    <dgm:cxn modelId="{70EB9E5B-4378-4851-829D-20DE666D67EC}" type="presOf" srcId="{6845A5CF-ABF5-41FE-9CD8-3742542A0037}" destId="{EF38EC58-EAE3-4E45-B979-EE70948D098E}" srcOrd="0" destOrd="0" presId="urn:microsoft.com/office/officeart/2005/8/layout/vList2"/>
     <dgm:cxn modelId="{9796D2BC-959A-489D-8489-799BB660A9A9}" srcId="{9DD1A594-42BA-4C61-B647-830D5FDFC715}" destId="{FC0FCCC8-0FAF-4285-BE50-D67D2E21F62B}" srcOrd="0" destOrd="0" parTransId="{9BC2BD98-D4A9-47C7-95FA-B9CD7541486D}" sibTransId="{36D6FE8A-0C4C-4C3E-A9F0-D644AEB3E77B}"/>
     <dgm:cxn modelId="{D7FDD8C0-A954-4549-8AD2-25B38A5EA393}" type="presOf" srcId="{FC0FCCC8-0FAF-4285-BE50-D67D2E21F62B}" destId="{D945287C-34F7-49AE-89E2-FBAFEA849270}" srcOrd="0" destOrd="0" presId="urn:microsoft.com/office/officeart/2005/8/layout/vList2"/>
     <dgm:cxn modelId="{01A4C3CF-4477-47EA-AA0F-E2E5650C023F}" type="presOf" srcId="{18E5233E-0C70-4C8A-A535-F0B7EF185F4C}" destId="{16031EB5-B022-4F56-901F-7F71F4570837}" srcOrd="0" destOrd="0" presId="urn:microsoft.com/office/officeart/2005/8/layout/vList2"/>
@@ -15498,9 +15498,9 @@
   <dgm:cxnLst>
     <dgm:cxn modelId="{8760E50B-6BA4-434D-9E8F-243EFDCDD694}" srcId="{9DD1A594-42BA-4C61-B647-830D5FDFC715}" destId="{093D8F60-BD75-438C-876E-3A16A628DF40}" srcOrd="3" destOrd="0" parTransId="{C0B67558-C3BA-40FC-9E5B-72E1A5AC7011}" sibTransId="{E834EBEF-9AA3-4E01-80F9-9879FA2349C5}"/>
     <dgm:cxn modelId="{A010B134-3347-469C-B110-E4A756F91437}" srcId="{9DD1A594-42BA-4C61-B647-830D5FDFC715}" destId="{6845A5CF-ABF5-41FE-9CD8-3742542A0037}" srcOrd="2" destOrd="0" parTransId="{B5F0028E-E56F-4F7A-88BE-A063CA75E1EB}" sibTransId="{B1E96187-1758-44B7-8709-F2E31628140F}"/>
-    <dgm:cxn modelId="{70EB9E5B-4378-4851-829D-20DE666D67EC}" type="presOf" srcId="{6845A5CF-ABF5-41FE-9CD8-3742542A0037}" destId="{EF38EC58-EAE3-4E45-B979-EE70948D098E}" srcOrd="0" destOrd="0" presId="urn:microsoft.com/office/officeart/2005/8/layout/vList2"/>
     <dgm:cxn modelId="{CBC16548-3D8E-4E35-A796-187A3AB24A61}" srcId="{9DD1A594-42BA-4C61-B647-830D5FDFC715}" destId="{18E5233E-0C70-4C8A-A535-F0B7EF185F4C}" srcOrd="1" destOrd="0" parTransId="{BBC6015B-AF29-409E-A191-58E8FA4D0A70}" sibTransId="{BFAF086A-9417-451F-957A-231B42892705}"/>
     <dgm:cxn modelId="{1B897758-FFF4-41AA-BEFE-08EF016E064D}" type="presOf" srcId="{9DD1A594-42BA-4C61-B647-830D5FDFC715}" destId="{BEB3585F-CCB8-4FAC-9902-ED6487167A0B}" srcOrd="0" destOrd="0" presId="urn:microsoft.com/office/officeart/2005/8/layout/vList2"/>
+    <dgm:cxn modelId="{70EB9E5B-4378-4851-829D-20DE666D67EC}" type="presOf" srcId="{6845A5CF-ABF5-41FE-9CD8-3742542A0037}" destId="{EF38EC58-EAE3-4E45-B979-EE70948D098E}" srcOrd="0" destOrd="0" presId="urn:microsoft.com/office/officeart/2005/8/layout/vList2"/>
     <dgm:cxn modelId="{261A058F-7D5B-431E-99EE-82359ACAD0BB}" type="presOf" srcId="{093D8F60-BD75-438C-876E-3A16A628DF40}" destId="{8283B7CD-F4F4-4288-8E43-D86EDC2CA997}" srcOrd="0" destOrd="0" presId="urn:microsoft.com/office/officeart/2005/8/layout/vList2"/>
     <dgm:cxn modelId="{9796D2BC-959A-489D-8489-799BB660A9A9}" srcId="{9DD1A594-42BA-4C61-B647-830D5FDFC715}" destId="{FC0FCCC8-0FAF-4285-BE50-D67D2E21F62B}" srcOrd="0" destOrd="0" parTransId="{9BC2BD98-D4A9-47C7-95FA-B9CD7541486D}" sibTransId="{36D6FE8A-0C4C-4C3E-A9F0-D644AEB3E77B}"/>
     <dgm:cxn modelId="{D7FDD8C0-A954-4549-8AD2-25B38A5EA393}" type="presOf" srcId="{FC0FCCC8-0FAF-4285-BE50-D67D2E21F62B}" destId="{D945287C-34F7-49AE-89E2-FBAFEA849270}" srcOrd="0" destOrd="0" presId="urn:microsoft.com/office/officeart/2005/8/layout/vList2"/>
@@ -15608,7 +15608,7 @@
           </a:r>
           <a:r>
             <a:rPr lang="de-DE" sz="2200" kern="1200" dirty="0"/>
-            <a:t> ist von Steinschläge betroffen</a:t>
+            <a:t> ist von Steinschlägen betroffen</a:t>
           </a:r>
           <a:endParaRPr lang="en-US" sz="2200" kern="1200" dirty="0"/>
         </a:p>
@@ -16021,7 +16021,7 @@
           </a:pPr>
           <a:r>
             <a:rPr lang="de-DE" sz="2200" kern="1200" dirty="0"/>
-            <a:t>Jährliche Todeswahrscheinlichkeit</a:t>
+            <a:t>Jährliche Todeswahrscheinlichkeit berechnen</a:t>
           </a:r>
           <a:endParaRPr lang="en-US" sz="2200" kern="1200" dirty="0"/>
         </a:p>
@@ -16522,7 +16522,7 @@
           </a:pPr>
           <a:r>
             <a:rPr lang="de-CH" sz="2200" kern="1200" dirty="0"/>
-            <a:t>Nach kumulierter Zeitabstand sortieren</a:t>
+            <a:t>Nach kumuliertem Zeitabstand sortieren</a:t>
           </a:r>
           <a:endParaRPr lang="de-CH" sz="2200" kern="1200" noProof="0" dirty="0"/>
         </a:p>
@@ -16682,10 +16682,10 @@
             <a:buNone/>
           </a:pPr>
           <a:r>
-            <a:rPr lang="de-CH" sz="2200" kern="1200">
+            <a:rPr lang="de-CH" sz="2200" kern="1200" dirty="0">
               <a:sym typeface="Wingdings" panose="05000000000000000000" pitchFamily="2" charset="2"/>
             </a:rPr>
-            <a:t>Differenz der kumulierten Zeitabstand</a:t>
+            <a:t>Differenz der kumulierten Zeitabstände</a:t>
           </a:r>
           <a:endParaRPr lang="de-CH" sz="2200" kern="1200" noProof="0" dirty="0"/>
         </a:p>
@@ -16847,7 +16847,7 @@
             <a:rPr lang="de-CH" sz="2200" kern="1200" dirty="0">
               <a:sym typeface="Wingdings" panose="05000000000000000000" pitchFamily="2" charset="2"/>
             </a:rPr>
-            <a:t>Jahre simulierte: 135’920</a:t>
+            <a:t>Jahre simuliert: 135’920</a:t>
           </a:r>
         </a:p>
       </dsp:txBody>
@@ -38479,7 +38479,7 @@
           <a:p>
             <a:fld id="{D249233E-F6E6-4BD5-8D0F-887AF9D15A80}" type="datetimeFigureOut">
               <a:rPr lang="de-CH" smtClean="0"/>
-              <a:t>24.01.2022</a:t>
+              <a:t>25.01.22</a:t>
             </a:fld>
             <a:endParaRPr lang="de-CH"/>
           </a:p>
@@ -38793,7 +38793,41 @@
           <a:p>
             <a:r>
               <a:rPr lang="de-DE" dirty="0"/>
-              <a:t>Lukas</a:t>
+              <a:t>Guten Tag "Rocco" und herzlich </a:t>
+            </a:r>
+            <a:r>
+              <a:rPr lang="de-DE" dirty="0" err="1"/>
+              <a:t>wilkommen</a:t>
+            </a:r>
+            <a:r>
+              <a:rPr lang="de-DE" dirty="0"/>
+              <a:t> zu unserer Präsentation über die Challenge "STEINSCHLAGRISIKO". </a:t>
+            </a:r>
+          </a:p>
+          <a:p>
+            <a:r>
+              <a:rPr lang="de-DE" dirty="0"/>
+              <a:t>Die Challenge hat in den letzten Monaten </a:t>
+            </a:r>
+            <a:r>
+              <a:rPr lang="de-DE" b="1" u="none" dirty="0">
+                <a:solidFill>
+                  <a:srgbClr val="FF0000"/>
+                </a:solidFill>
+              </a:rPr>
+              <a:t>viel Zeit und Kraft </a:t>
+            </a:r>
+            <a:r>
+              <a:rPr lang="de-DE" dirty="0"/>
+              <a:t>von uns verlangt und wir sind stolz darauf, dass wir dir nun die </a:t>
+            </a:r>
+            <a:r>
+              <a:rPr lang="de-DE" b="1" dirty="0"/>
+              <a:t>Resultate präsentieren dürfen.</a:t>
+            </a:r>
+            <a:r>
+              <a:rPr lang="de-DE" dirty="0"/>
+              <a:t> </a:t>
             </a:r>
             <a:endParaRPr lang="de-CH" dirty="0"/>
           </a:p>
@@ -41149,7 +41183,7 @@
                 <a:effectLst/>
                 <a:latin typeface="Helvetica Neue"/>
               </a:rPr>
-              <a:t>Sicherheitsnetze sind bis zu einer Aufprallenergie von 1000 kJ sicher. Falls bereits ein Stein mit über 2000 kg in den Sicherheitsnetzen liegt, beträgt die Aufprallenergie, die von den Sicherheitsnetzen aufgenommen werden kann, nur noch 500 kJ. Steine in den Sicherheitsnetze werden vom Unterhaltsteam entfernt (die Reaktionszeit beträgt 24 Stunden).</a:t>
+              <a:t>Um einen genauen Überblick zu haben, wann es bei den Sicherheitsnetzen zu einem Durchbruch kommen kann, haben wir in einem Flussdiagramm alle wesentlichen Punkte notiert. </a:t>
             </a:r>
           </a:p>
           <a:p>
@@ -41162,7 +41196,133 @@
                 <a:effectLst/>
                 <a:latin typeface="Helvetica Neue"/>
               </a:rPr>
-              <a:t>Nachfolgend wird die Wahrscheinlichkeit eines Durchbruches aufgrund der Energie und Masse berechnet.</a:t>
+              <a:t>Wenn sich ein Stein löst muss man zuerst feststellen, ob sich bereits eine Masse von </a:t>
+            </a:r>
+            <a:r>
+              <a:rPr lang="de-DE" b="0" i="0" dirty="0" err="1">
+                <a:solidFill>
+                  <a:srgbClr val="000000"/>
+                </a:solidFill>
+                <a:effectLst/>
+                <a:latin typeface="Helvetica Neue"/>
+              </a:rPr>
+              <a:t>insgesammt</a:t>
+            </a:r>
+            <a:r>
+              <a:rPr lang="de-DE" b="0" i="0" dirty="0">
+                <a:solidFill>
+                  <a:srgbClr val="000000"/>
+                </a:solidFill>
+                <a:effectLst/>
+                <a:latin typeface="Helvetica Neue"/>
+              </a:rPr>
+              <a:t> 2000kg in den Sicherheitsnetzen befindet. Falls nein, dann hält das Netz noch eine Aufprall Energie von 1000kj aus. Wenn also ein Stein mit 1000kj oder mehr in das Netz fliegt, dann ist mit einem </a:t>
+            </a:r>
+            <a:r>
+              <a:rPr lang="de-DE" b="0" i="0" dirty="0" err="1">
+                <a:solidFill>
+                  <a:srgbClr val="000000"/>
+                </a:solidFill>
+                <a:effectLst/>
+                <a:latin typeface="Helvetica Neue"/>
+              </a:rPr>
+              <a:t>Netzdurckbruch</a:t>
+            </a:r>
+            <a:r>
+              <a:rPr lang="de-DE" b="0" i="0" dirty="0">
+                <a:solidFill>
+                  <a:srgbClr val="000000"/>
+                </a:solidFill>
+                <a:effectLst/>
+                <a:latin typeface="Helvetica Neue"/>
+              </a:rPr>
+              <a:t> zu rechnen. Wenn die Aufprall </a:t>
+            </a:r>
+            <a:r>
+              <a:rPr lang="de-DE" b="0" i="0" dirty="0" err="1">
+                <a:solidFill>
+                  <a:srgbClr val="000000"/>
+                </a:solidFill>
+                <a:effectLst/>
+                <a:latin typeface="Helvetica Neue"/>
+              </a:rPr>
+              <a:t>energie</a:t>
+            </a:r>
+            <a:r>
+              <a:rPr lang="de-DE" b="0" i="0" dirty="0">
+                <a:solidFill>
+                  <a:srgbClr val="000000"/>
+                </a:solidFill>
+                <a:effectLst/>
+                <a:latin typeface="Helvetica Neue"/>
+              </a:rPr>
+              <a:t> aber weniger beträgt, so hält das Netz stand. </a:t>
+            </a:r>
+          </a:p>
+          <a:p>
+            <a:pPr algn="l"/>
+            <a:r>
+              <a:rPr lang="de-DE" b="0" i="0" dirty="0">
+                <a:solidFill>
+                  <a:srgbClr val="000000"/>
+                </a:solidFill>
+                <a:effectLst/>
+                <a:latin typeface="Helvetica Neue"/>
+              </a:rPr>
+              <a:t>Falls sich allerdings wie hier im oberen Bereich des Flussdiagramms 2000kg Steine im Netz befinden. So ist das Netz nur noch bis zu einer Aufprallenergie von 500kj sicher. Wenn diese Energie überschritten wird, dann kommt es zu einem Netzdurchbruch. </a:t>
+            </a:r>
+          </a:p>
+          <a:p>
+            <a:pPr algn="l"/>
+            <a:r>
+              <a:rPr lang="de-DE" b="0" i="0" dirty="0">
+                <a:solidFill>
+                  <a:srgbClr val="000000"/>
+                </a:solidFill>
+                <a:effectLst/>
+                <a:latin typeface="Helvetica Neue"/>
+              </a:rPr>
+              <a:t>Diese Faktoren haben wir natürlich auch in unserem Modell berücksichtigt. Mit den Berechnungen kamen wir dann auf eine Anzahl von </a:t>
+            </a:r>
+            <a:r>
+              <a:rPr lang="de-DE" b="0" i="0" dirty="0" err="1">
+                <a:solidFill>
+                  <a:srgbClr val="000000"/>
+                </a:solidFill>
+                <a:effectLst/>
+                <a:latin typeface="Helvetica Neue"/>
+              </a:rPr>
+              <a:t>insgesammt</a:t>
+            </a:r>
+            <a:r>
+              <a:rPr lang="de-DE" b="0" i="0" dirty="0">
+                <a:solidFill>
+                  <a:srgbClr val="000000"/>
+                </a:solidFill>
+                <a:effectLst/>
+                <a:latin typeface="Helvetica Neue"/>
+              </a:rPr>
+              <a:t> 5121 Durchbrüchen. Das klingt erstmal viel, es sind jedoch somit nur 0.037 Durchbrüche pro </a:t>
+            </a:r>
+            <a:r>
+              <a:rPr lang="de-DE" b="0" i="0" dirty="0" err="1">
+                <a:solidFill>
+                  <a:srgbClr val="000000"/>
+                </a:solidFill>
+                <a:effectLst/>
+                <a:latin typeface="Helvetica Neue"/>
+              </a:rPr>
+              <a:t>Jahr.l</a:t>
+            </a:r>
+            <a:r>
+              <a:rPr lang="de-DE" b="0" i="0" dirty="0">
+                <a:solidFill>
+                  <a:srgbClr val="000000"/>
+                </a:solidFill>
+                <a:effectLst/>
+                <a:latin typeface="Helvetica Neue"/>
+              </a:rPr>
+              <a:t> </a:t>
             </a:r>
           </a:p>
           <a:p>
@@ -41280,7 +41440,62 @@
             <a:endParaRPr lang="de-CH" dirty="0"/>
           </a:p>
           <a:p>
-            <a:endParaRPr lang="de-CH" dirty="0"/>
+            <a:r>
+              <a:rPr lang="de-CH" dirty="0"/>
+              <a:t>Kommen wir zuerst zur Ausgangslage:</a:t>
+            </a:r>
+          </a:p>
+          <a:p>
+            <a:r>
+              <a:rPr lang="de-CH" dirty="0"/>
+              <a:t>- In unserer Aufgabenstellung geht es um die Kantonsstrasse von </a:t>
+            </a:r>
+            <a:r>
+              <a:rPr lang="de-CH" dirty="0" err="1"/>
+              <a:t>Schiers</a:t>
+            </a:r>
+            <a:r>
+              <a:rPr lang="de-CH" dirty="0"/>
+              <a:t>, welche von regelmässigen Steinschlägen betroffen ist. </a:t>
+            </a:r>
+          </a:p>
+          <a:p>
+            <a:r>
+              <a:rPr lang="de-CH" dirty="0"/>
+              <a:t>- Dabei gibt es zwei Zonen, in denen die Steinschläge vorkommen können. In diesem Fall sprechen wir von Ablösungszone 1 und 2.</a:t>
+            </a:r>
+          </a:p>
+          <a:p>
+            <a:r>
+              <a:rPr lang="de-CH" dirty="0"/>
+              <a:t>- Uns wurden Messdaten von den letzten 3 Monaten zur Verfügung gestellt. Die Daten wurden einerseits von Sensoren aufgezeichnet und auch von Experten und Geologen geprüft. </a:t>
+            </a:r>
+          </a:p>
+          <a:p>
+            <a:r>
+              <a:rPr lang="de-CH" dirty="0"/>
+              <a:t>- Die Strasse wird an Beiden Ablösungszonen mit Sicherheitsnetzen gesichert. Diese sind jedoch schon in die Jahre gekommen und müssen erneuert werden. Da die Renovation von den Sicherheitsnetzen allerdings ein Jahr dauern wird, muss abgeschätzt werden, ob die Strasse noch sicher ist, oder ob man sie bis zur </a:t>
+            </a:r>
+            <a:r>
+              <a:rPr lang="de-CH" dirty="0" err="1"/>
+              <a:t>fertigstellung</a:t>
+            </a:r>
+            <a:r>
+              <a:rPr lang="de-CH" dirty="0"/>
+              <a:t> der neuen Netze schliessen muss. </a:t>
+            </a:r>
+          </a:p>
+          <a:p>
+            <a:r>
+              <a:rPr lang="de-CH" dirty="0"/>
+              <a:t>- Das veraltete netzt führt natürlich zu Verunsicherung bei der Bevölkerung. </a:t>
+            </a:r>
+          </a:p>
+          <a:p>
+            <a:r>
+              <a:rPr lang="de-CH" dirty="0"/>
+              <a:t>- Wir hatten nun die Aufgabe, die Jährliche Todeswahrscheinlichkeit berechnen um sicherzustellen, ob die Strasse offen bleiben darf.  </a:t>
+            </a:r>
           </a:p>
         </p:txBody>
       </p:sp>
@@ -42314,26 +42529,182 @@
           </a:p>
           <a:p>
             <a:r>
+              <a:rPr lang="de-DE" b="1" dirty="0"/>
+              <a:t>Wie</a:t>
+            </a:r>
+            <a:r>
               <a:rPr lang="de-DE" dirty="0"/>
-              <a:t>Wie haben wir im Team gearbeitet</a:t>
+              <a:t> haben wir im Team gearbeitet und mit welchen Tools haben wir uns organisiert??</a:t>
             </a:r>
           </a:p>
           <a:p>
             <a:r>
               <a:rPr lang="de-DE" dirty="0"/>
-              <a:t>mit welchen Tools</a:t>
+              <a:t>Nun, Als </a:t>
             </a:r>
+            <a:r>
+              <a:rPr lang="de-DE" b="1" dirty="0"/>
+              <a:t>erstes haben wir ein </a:t>
+            </a:r>
+            <a:r>
+              <a:rPr lang="de-DE" b="1" dirty="0" err="1"/>
+              <a:t>GitHub</a:t>
+            </a:r>
+            <a:r>
+              <a:rPr lang="de-DE" b="1" dirty="0"/>
+              <a:t> Repository </a:t>
+            </a:r>
+            <a:r>
+              <a:rPr lang="de-DE" dirty="0"/>
+              <a:t>erstellt mit dem Titel "Steinschlag Challenge" und sicher gestellt, dass wir </a:t>
+            </a:r>
+            <a:r>
+              <a:rPr lang="de-DE" b="1" dirty="0"/>
+              <a:t>alle vier Zugriff darauf haben</a:t>
+            </a:r>
+            <a:r>
+              <a:rPr lang="de-DE" dirty="0"/>
+              <a:t>. Dort konnten wir jeweils unsere </a:t>
+            </a:r>
+            <a:r>
+              <a:rPr lang="de-DE" b="1" dirty="0"/>
+              <a:t>Änderungen speichern </a:t>
+            </a:r>
+            <a:r>
+              <a:rPr lang="de-DE" dirty="0"/>
+              <a:t>und jedes Gruppenmitglied konnte laufend den </a:t>
+            </a:r>
+            <a:r>
+              <a:rPr lang="de-DE" b="1" dirty="0"/>
+              <a:t>aktuellen Stand beobachten</a:t>
+            </a:r>
+            <a:r>
+              <a:rPr lang="de-DE" dirty="0"/>
+              <a:t>. Das System hat gut funktioniert, da wir somit auch von Zuhause aus und zu jederzeit zugriff auf unsere Daten hatten. </a:t>
+            </a:r>
+          </a:p>
+          <a:p>
+            <a:endParaRPr lang="de-DE" dirty="0"/>
           </a:p>
           <a:p>
             <a:r>
               <a:rPr lang="de-DE" dirty="0"/>
-              <a:t>Aufgabenaufteilung</a:t>
+              <a:t>Die </a:t>
             </a:r>
+            <a:r>
+              <a:rPr lang="de-DE" b="1" dirty="0"/>
+              <a:t>Aufgabenverteilung</a:t>
+            </a:r>
+            <a:r>
+              <a:rPr lang="de-DE" dirty="0"/>
+              <a:t> haben wir über </a:t>
+            </a:r>
+            <a:r>
+              <a:rPr lang="de-DE" b="1" dirty="0" err="1"/>
+              <a:t>Trello</a:t>
+            </a:r>
+            <a:r>
+              <a:rPr lang="de-DE" dirty="0"/>
+              <a:t> vorgenommen. Auf der Website konnten wir jeweils notieren, an welcher spezifischen Arbeit wir geraden </a:t>
+            </a:r>
+            <a:r>
+              <a:rPr lang="de-DE" dirty="0" err="1"/>
+              <a:t>drann</a:t>
+            </a:r>
+            <a:r>
+              <a:rPr lang="de-DE" dirty="0"/>
+              <a:t> waren. Ebenfalls haben wir dort eine </a:t>
+            </a:r>
+            <a:r>
+              <a:rPr lang="de-DE" dirty="0" err="1"/>
+              <a:t>To</a:t>
+            </a:r>
+            <a:r>
+              <a:rPr lang="de-DE" dirty="0"/>
+              <a:t> Do Liste erstellt, damit alle wussten, was sie zu tun hatten. Wenn jemand eine seiner Aufgaben </a:t>
+            </a:r>
+            <a:r>
+              <a:rPr lang="de-DE" dirty="0" err="1"/>
+              <a:t>erletigt</a:t>
+            </a:r>
+            <a:r>
+              <a:rPr lang="de-DE" dirty="0"/>
+              <a:t> hatte, so konnte er das auf </a:t>
+            </a:r>
+            <a:r>
+              <a:rPr lang="de-DE" dirty="0" err="1"/>
+              <a:t>Trello</a:t>
+            </a:r>
+            <a:r>
+              <a:rPr lang="de-DE" dirty="0"/>
+              <a:t> vermerken und alle hatten wieder eine aktualisierte </a:t>
+            </a:r>
+            <a:r>
+              <a:rPr lang="de-DE" dirty="0" err="1"/>
+              <a:t>to</a:t>
+            </a:r>
+            <a:r>
+              <a:rPr lang="de-DE" dirty="0"/>
+              <a:t> do Liste. </a:t>
+            </a:r>
+          </a:p>
+          <a:p>
+            <a:endParaRPr lang="de-DE" dirty="0"/>
           </a:p>
           <a:p>
             <a:r>
               <a:rPr lang="de-DE" dirty="0"/>
-              <a:t>Vor Ort oder Teams</a:t>
+              <a:t>Unser Python Code und alle Berechnungen haben wir in einem </a:t>
+            </a:r>
+            <a:r>
+              <a:rPr lang="de-DE" dirty="0" err="1"/>
+              <a:t>Jupyter</a:t>
+            </a:r>
+            <a:r>
+              <a:rPr lang="de-DE" dirty="0"/>
+              <a:t> Notebook vorgenommen. Dieses haben wir wie bereits erwähnt auf </a:t>
+            </a:r>
+            <a:r>
+              <a:rPr lang="de-DE" dirty="0" err="1"/>
+              <a:t>GitHub</a:t>
+            </a:r>
+            <a:r>
+              <a:rPr lang="de-DE" dirty="0"/>
+              <a:t> gespeichert. Das </a:t>
+            </a:r>
+            <a:r>
+              <a:rPr lang="de-DE" dirty="0" err="1"/>
+              <a:t>Jupyter</a:t>
+            </a:r>
+            <a:r>
+              <a:rPr lang="de-DE" dirty="0"/>
+              <a:t> Notebook hat sich gut für dieses Projekt geeignet, da es sehr übersichtlich ist, wir den Code gut dokumentieren konnten und nach jedem Schritt, direkt den Befehl ausführen konnten. So merkten wir schnell wenn wir etwas falsch programmiert haben und konnten die Änderungen direkt anpassen. </a:t>
+            </a:r>
+          </a:p>
+          <a:p>
+            <a:endParaRPr lang="de-DE" dirty="0"/>
+          </a:p>
+          <a:p>
+            <a:r>
+              <a:rPr lang="de-DE" dirty="0"/>
+              <a:t>Natürlich durften auch Team Meetings nicht fehlen. Wir haben uns in in ca. 3-4 Wöchigen Abständen in der Schule oder via Microsoft Teams getroffen. Während den Meetings haben wir zusammen die Grundlegenden Fragen besprochen, Brainstorming geführt und die Aufgaben verteilt, damit jeder wieder wusste, an was er Arbeiten kann. </a:t>
+            </a:r>
+          </a:p>
+          <a:p>
+            <a:endParaRPr lang="de-DE" dirty="0"/>
+          </a:p>
+          <a:p>
+            <a:r>
+              <a:rPr lang="de-DE" dirty="0"/>
+              <a:t>Im </a:t>
+            </a:r>
+            <a:r>
+              <a:rPr lang="de-DE" dirty="0" err="1"/>
+              <a:t>Grossen</a:t>
+            </a:r>
+            <a:r>
+              <a:rPr lang="de-DE" dirty="0"/>
+              <a:t> und Ganzen, hat die Teamarbeit über die Challenge hinaus sehr gut funktioniert und wir konnten uns auch gegenseitig besser kennenlernen. </a:t>
             </a:r>
           </a:p>
           <a:p>
@@ -43164,7 +43535,7 @@
           <a:p>
             <a:fld id="{80020296-3345-4314-BE3C-63AEC21FFBF4}" type="datetime1">
               <a:rPr lang="en-US" smtClean="0"/>
-              <a:t>1/24/2022</a:t>
+              <a:t>1/25/22</a:t>
             </a:fld>
             <a:endParaRPr lang="en-US" dirty="0"/>
           </a:p>
@@ -43366,7 +43737,7 @@
           <a:p>
             <a:fld id="{5F181BB4-B15F-4781-B18E-C61D89E95F1F}" type="datetime1">
               <a:rPr lang="en-US" smtClean="0"/>
-              <a:t>1/24/2022</a:t>
+              <a:t>1/25/22</a:t>
             </a:fld>
             <a:endParaRPr lang="en-US" dirty="0"/>
           </a:p>
@@ -43578,7 +43949,7 @@
           <a:p>
             <a:fld id="{389CB775-4552-4EC9-934E-115299A87317}" type="datetime1">
               <a:rPr lang="en-US" smtClean="0"/>
-              <a:t>1/24/2022</a:t>
+              <a:t>1/25/22</a:t>
             </a:fld>
             <a:endParaRPr lang="en-US" dirty="0"/>
           </a:p>
@@ -43780,7 +44151,7 @@
           <a:p>
             <a:fld id="{2F906713-C74A-4CBA-B694-821617ABFF32}" type="datetime1">
               <a:rPr lang="en-US" smtClean="0"/>
-              <a:t>1/24/2022</a:t>
+              <a:t>1/25/22</a:t>
             </a:fld>
             <a:endParaRPr lang="en-US" dirty="0"/>
           </a:p>
@@ -44058,7 +44429,7 @@
           <a:p>
             <a:fld id="{EBFE4EE4-C210-49E2-AD1E-E46D3766A14E}" type="datetime1">
               <a:rPr lang="en-US" smtClean="0"/>
-              <a:t>1/24/2022</a:t>
+              <a:t>1/25/22</a:t>
             </a:fld>
             <a:endParaRPr lang="en-US" dirty="0"/>
           </a:p>
@@ -44328,7 +44699,7 @@
           <a:p>
             <a:fld id="{38196C97-E1A4-4DAC-B18B-328B9AC2380F}" type="datetime1">
               <a:rPr lang="en-US" smtClean="0"/>
-              <a:t>1/24/2022</a:t>
+              <a:t>1/25/22</a:t>
             </a:fld>
             <a:endParaRPr lang="en-US" dirty="0"/>
           </a:p>
@@ -44745,7 +45116,7 @@
           <a:p>
             <a:fld id="{93CF6138-A04F-4243-B578-72E7982DA47A}" type="datetime1">
               <a:rPr lang="en-US" smtClean="0"/>
-              <a:t>1/24/2022</a:t>
+              <a:t>1/25/22</a:t>
             </a:fld>
             <a:endParaRPr lang="en-US" dirty="0"/>
           </a:p>
@@ -44889,7 +45260,7 @@
           <a:p>
             <a:fld id="{A69CADF8-4F87-44CE-B6CA-F34C8A1A97DF}" type="datetime1">
               <a:rPr lang="en-US" smtClean="0"/>
-              <a:t>1/24/2022</a:t>
+              <a:t>1/25/22</a:t>
             </a:fld>
             <a:endParaRPr lang="en-US" dirty="0"/>
           </a:p>
@@ -45004,7 +45375,7 @@
           <a:p>
             <a:fld id="{23E56F23-EBFB-4093-A04D-056E9FF698EB}" type="datetime1">
               <a:rPr lang="en-US" smtClean="0"/>
-              <a:t>1/24/2022</a:t>
+              <a:t>1/25/22</a:t>
             </a:fld>
             <a:endParaRPr lang="en-US" dirty="0"/>
           </a:p>
@@ -45319,7 +45690,7 @@
           <a:p>
             <a:fld id="{1D10089C-A521-4DD8-8C2F-F1136A3C80BD}" type="datetime1">
               <a:rPr lang="en-US" smtClean="0"/>
-              <a:t>1/24/2022</a:t>
+              <a:t>1/25/22</a:t>
             </a:fld>
             <a:endParaRPr lang="en-US" dirty="0"/>
           </a:p>
@@ -45610,7 +45981,7 @@
           <a:p>
             <a:fld id="{DAB5D9C6-B34D-43D8-9E4F-1282694CB653}" type="datetime1">
               <a:rPr lang="en-US" smtClean="0"/>
-              <a:t>1/24/2022</a:t>
+              <a:t>1/25/22</a:t>
             </a:fld>
             <a:endParaRPr lang="en-US" dirty="0"/>
           </a:p>
@@ -45855,7 +46226,7 @@
           <a:p>
             <a:fld id="{CD4C00DD-07A2-4DC7-B463-BADC4CE40A75}" type="datetime1">
               <a:rPr lang="en-US" smtClean="0"/>
-              <a:t>1/24/2022</a:t>
+              <a:t>1/25/22</a:t>
             </a:fld>
             <a:endParaRPr lang="en-US" dirty="0"/>
           </a:p>
@@ -46510,14 +46881,14 @@
           <a:lstStyle/>
           <a:p>
             <a:r>
-              <a:rPr lang="de-DE" dirty="0">
+              <a:rPr lang="de-DE" b="1" dirty="0">
                 <a:solidFill>
                   <a:schemeClr val="tx1"/>
                 </a:solidFill>
               </a:rPr>
               <a:t>Vergleich der Zonen</a:t>
             </a:r>
-            <a:endParaRPr lang="de-CH" dirty="0">
+            <a:endParaRPr lang="de-CH" b="1" dirty="0">
               <a:solidFill>
                 <a:schemeClr val="tx1"/>
               </a:solidFill>
@@ -46983,18 +47354,10 @@
           <a:lstStyle/>
           <a:p>
             <a:r>
-              <a:rPr lang="de-DE" dirty="0">
-                <a:solidFill>
-                  <a:schemeClr val="tx1"/>
-                </a:solidFill>
-              </a:rPr>
+              <a:rPr lang="de-DE" b="1" dirty="0"/>
               <a:t>Zeitabstände</a:t>
             </a:r>
-            <a:endParaRPr lang="de-CH" dirty="0">
-              <a:solidFill>
-                <a:schemeClr val="tx1"/>
-              </a:solidFill>
-            </a:endParaRPr>
+            <a:endParaRPr lang="de-CH" b="1" dirty="0"/>
           </a:p>
         </p:txBody>
       </p:sp>
@@ -47288,18 +47651,22 @@
           <a:lstStyle/>
           <a:p>
             <a:r>
+              <a:rPr lang="de-DE" b="1" dirty="0"/>
+              <a:t>Kumulative</a:t>
+            </a:r>
+            <a:r>
               <a:rPr lang="de-DE" dirty="0">
                 <a:solidFill>
                   <a:schemeClr val="tx1"/>
                 </a:solidFill>
               </a:rPr>
-              <a:t>Kumulative Funktionsverteilung (CDF)</a:t>
+              <a:t> </a:t>
             </a:r>
-            <a:endParaRPr lang="de-CH" dirty="0">
-              <a:solidFill>
-                <a:schemeClr val="tx1"/>
-              </a:solidFill>
-            </a:endParaRPr>
+            <a:r>
+              <a:rPr lang="de-DE" b="1" dirty="0"/>
+              <a:t>Funktionsverteilung (CDF)</a:t>
+            </a:r>
+            <a:endParaRPr lang="de-CH" b="1" dirty="0"/>
           </a:p>
         </p:txBody>
       </p:sp>
@@ -47623,22 +47990,10 @@
           <a:lstStyle/>
           <a:p>
             <a:r>
-              <a:rPr lang="de-DE" dirty="0">
-                <a:solidFill>
-                  <a:schemeClr val="tx1"/>
-                </a:solidFill>
-              </a:rPr>
-              <a:t>CDF </a:t>
+              <a:rPr lang="de-DE" b="1" dirty="0"/>
+              <a:t>CDF Masse</a:t>
             </a:r>
-            <a:r>
-              <a:rPr lang="de-DE" dirty="0"/>
-              <a:t>Masse</a:t>
-            </a:r>
-            <a:endParaRPr lang="de-CH" dirty="0">
-              <a:solidFill>
-                <a:schemeClr val="tx1"/>
-              </a:solidFill>
-            </a:endParaRPr>
+            <a:endParaRPr lang="de-CH" b="1" dirty="0"/>
           </a:p>
         </p:txBody>
       </p:sp>
@@ -48086,22 +48441,10 @@
           <a:lstStyle/>
           <a:p>
             <a:r>
-              <a:rPr lang="de-DE" dirty="0">
-                <a:solidFill>
-                  <a:schemeClr val="tx1"/>
-                </a:solidFill>
-              </a:rPr>
-              <a:t>CDF </a:t>
+              <a:rPr lang="de-DE" b="1" dirty="0"/>
+              <a:t>CDF Geschwindigkeit</a:t>
             </a:r>
-            <a:r>
-              <a:rPr lang="de-DE" dirty="0"/>
-              <a:t>Geschwindigkeit</a:t>
-            </a:r>
-            <a:endParaRPr lang="de-CH" dirty="0">
-              <a:solidFill>
-                <a:schemeClr val="tx1"/>
-              </a:solidFill>
-            </a:endParaRPr>
+            <a:endParaRPr lang="de-CH" b="1" dirty="0"/>
           </a:p>
         </p:txBody>
       </p:sp>
@@ -48549,22 +48892,10 @@
           <a:lstStyle/>
           <a:p>
             <a:r>
-              <a:rPr lang="de-DE" dirty="0">
-                <a:solidFill>
-                  <a:schemeClr val="tx1"/>
-                </a:solidFill>
-              </a:rPr>
-              <a:t>CDF </a:t>
+              <a:rPr lang="de-DE" b="1" dirty="0"/>
+              <a:t>CDF Zeitabstand</a:t>
             </a:r>
-            <a:r>
-              <a:rPr lang="de-DE" dirty="0"/>
-              <a:t>Zeitabstand</a:t>
-            </a:r>
-            <a:endParaRPr lang="de-CH" dirty="0">
-              <a:solidFill>
-                <a:schemeClr val="tx1"/>
-              </a:solidFill>
-            </a:endParaRPr>
+            <a:endParaRPr lang="de-CH" b="1" dirty="0"/>
           </a:p>
         </p:txBody>
       </p:sp>
@@ -49012,18 +49343,10 @@
           <a:lstStyle/>
           <a:p>
             <a:r>
-              <a:rPr lang="de-DE" dirty="0">
-                <a:solidFill>
-                  <a:schemeClr val="tx1"/>
-                </a:solidFill>
-              </a:rPr>
+              <a:rPr lang="de-DE" b="1" dirty="0"/>
               <a:t>Monte Carlo Simulation</a:t>
             </a:r>
-            <a:endParaRPr lang="de-CH" dirty="0">
-              <a:solidFill>
-                <a:schemeClr val="tx1"/>
-              </a:solidFill>
-            </a:endParaRPr>
+            <a:endParaRPr lang="de-CH" b="1" dirty="0"/>
           </a:p>
         </p:txBody>
       </p:sp>
@@ -49374,18 +49697,10 @@
           <a:lstStyle/>
           <a:p>
             <a:r>
-              <a:rPr lang="de-DE" dirty="0">
-                <a:solidFill>
-                  <a:schemeClr val="tx1"/>
-                </a:solidFill>
-              </a:rPr>
+              <a:rPr lang="de-DE" b="1" dirty="0"/>
               <a:t>Anpassung der Zeitabstände </a:t>
             </a:r>
-            <a:endParaRPr lang="de-CH" dirty="0">
-              <a:solidFill>
-                <a:schemeClr val="tx1"/>
-              </a:solidFill>
-            </a:endParaRPr>
+            <a:endParaRPr lang="de-CH" b="1" dirty="0"/>
           </a:p>
         </p:txBody>
       </p:sp>
@@ -49767,18 +50082,10 @@
           <a:lstStyle/>
           <a:p>
             <a:r>
-              <a:rPr lang="de-DE" dirty="0">
-                <a:solidFill>
-                  <a:schemeClr val="tx1"/>
-                </a:solidFill>
-              </a:rPr>
+              <a:rPr lang="de-DE" b="1" dirty="0"/>
               <a:t>Anzahl simulierte Jahre</a:t>
             </a:r>
-            <a:endParaRPr lang="de-CH" dirty="0">
-              <a:solidFill>
-                <a:schemeClr val="tx1"/>
-              </a:solidFill>
-            </a:endParaRPr>
+            <a:endParaRPr lang="de-CH" b="1" dirty="0"/>
           </a:p>
         </p:txBody>
       </p:sp>
@@ -50074,7 +50381,7 @@
           <p:nvPr>
             <p:extLst>
               <p:ext uri="{D42A27DB-BD31-4B8C-83A1-F6EECF244321}">
-                <p14:modId xmlns:p14="http://schemas.microsoft.com/office/powerpoint/2010/main" val="2100833089"/>
+                <p14:modId xmlns:p14="http://schemas.microsoft.com/office/powerpoint/2010/main" val="2138980614"/>
               </p:ext>
             </p:extLst>
           </p:nvPr>
@@ -50556,7 +50863,7 @@
           <a:lstStyle/>
           <a:p>
             <a:r>
-              <a:rPr lang="de-CH" dirty="0">
+              <a:rPr lang="de-CH" b="1" dirty="0">
                 <a:solidFill>
                   <a:schemeClr val="tx1"/>
                 </a:solidFill>
@@ -50609,7 +50916,7 @@
           <p:nvPr>
             <p:extLst>
               <p:ext uri="{D42A27DB-BD31-4B8C-83A1-F6EECF244321}">
-                <p14:modId xmlns:p14="http://schemas.microsoft.com/office/powerpoint/2010/main" val="1996304548"/>
+                <p14:modId xmlns:p14="http://schemas.microsoft.com/office/powerpoint/2010/main" val="3319514169"/>
               </p:ext>
             </p:extLst>
           </p:nvPr>
@@ -50880,18 +51187,10 @@
           <a:lstStyle/>
           <a:p>
             <a:r>
-              <a:rPr lang="de-DE" dirty="0">
-                <a:solidFill>
-                  <a:schemeClr val="tx1"/>
-                </a:solidFill>
-              </a:rPr>
+              <a:rPr lang="de-DE" b="1" dirty="0"/>
               <a:t>Verkehr</a:t>
             </a:r>
-            <a:endParaRPr lang="de-CH" dirty="0">
-              <a:solidFill>
-                <a:schemeClr val="tx1"/>
-              </a:solidFill>
-            </a:endParaRPr>
+            <a:endParaRPr lang="de-CH" b="1" dirty="0"/>
           </a:p>
         </p:txBody>
       </p:sp>
@@ -51880,18 +52179,10 @@
           <a:lstStyle/>
           <a:p>
             <a:r>
-              <a:rPr lang="de-DE" dirty="0">
-                <a:solidFill>
-                  <a:schemeClr val="tx1"/>
-                </a:solidFill>
-              </a:rPr>
+              <a:rPr lang="de-DE" b="1" dirty="0"/>
               <a:t>Verkehr</a:t>
             </a:r>
-            <a:endParaRPr lang="de-CH" dirty="0">
-              <a:solidFill>
-                <a:schemeClr val="tx1"/>
-              </a:solidFill>
-            </a:endParaRPr>
+            <a:endParaRPr lang="de-CH" b="1" dirty="0"/>
           </a:p>
         </p:txBody>
       </p:sp>
@@ -53051,18 +53342,10 @@
           <a:lstStyle/>
           <a:p>
             <a:r>
-              <a:rPr lang="de-DE" dirty="0">
-                <a:solidFill>
-                  <a:schemeClr val="tx1"/>
-                </a:solidFill>
-              </a:rPr>
+              <a:rPr lang="de-DE" b="1" dirty="0"/>
               <a:t>Die Beichte</a:t>
             </a:r>
-            <a:endParaRPr lang="de-CH" dirty="0">
-              <a:solidFill>
-                <a:schemeClr val="tx1"/>
-              </a:solidFill>
-            </a:endParaRPr>
+            <a:endParaRPr lang="de-CH" b="1" dirty="0"/>
           </a:p>
         </p:txBody>
       </p:sp>
@@ -53326,12 +53609,16 @@
           <a:lstStyle/>
           <a:p>
             <a:r>
+              <a:rPr lang="de-DE" b="1" dirty="0"/>
+              <a:t>Fazit</a:t>
+            </a:r>
+            <a:r>
               <a:rPr lang="de-DE" dirty="0">
                 <a:solidFill>
                   <a:schemeClr val="tx1"/>
                 </a:solidFill>
               </a:rPr>
-              <a:t>Fazit </a:t>
+              <a:t> </a:t>
             </a:r>
             <a:endParaRPr lang="de-CH" dirty="0">
               <a:solidFill>
@@ -53873,11 +54160,7 @@
           <a:lstStyle/>
           <a:p>
             <a:r>
-              <a:rPr lang="de-DE" dirty="0" err="1">
-                <a:solidFill>
-                  <a:schemeClr val="tx1"/>
-                </a:solidFill>
-              </a:rPr>
+              <a:rPr lang="de-DE" b="1" dirty="0" err="1"/>
               <a:t>Learnings</a:t>
             </a:r>
             <a:r>
@@ -54469,7 +54752,7 @@
           <a:p>
             <a:pPr algn="ctr"/>
             <a:r>
-              <a:rPr lang="en-US" b="1" dirty="0">
+              <a:rPr lang="en-US" b="1" dirty="0" err="1">
                 <a:solidFill>
                   <a:schemeClr val="bg1"/>
                 </a:solidFill>
@@ -54631,7 +54914,7 @@
           <a:lstStyle/>
           <a:p>
             <a:r>
-              <a:rPr lang="de-CH" dirty="0">
+              <a:rPr lang="de-CH" b="1" dirty="0">
                 <a:solidFill>
                   <a:schemeClr val="tx1"/>
                 </a:solidFill>
@@ -54805,10 +55088,10 @@
       </p:sp>
       <p:pic>
         <p:nvPicPr>
-          <p:cNvPr id="22530" name="Picture 2">
+          <p:cNvPr id="1026" name="Picture 2" descr="Teamwork icon – Stock-Vektorgrafik | Adobe Stock">
             <a:extLst>
               <a:ext uri="{FF2B5EF4-FFF2-40B4-BE49-F238E27FC236}">
-                <a16:creationId xmlns:a16="http://schemas.microsoft.com/office/drawing/2014/main" id="{45BF03C2-77D7-4F94-891E-8B8D63A62B69}"/>
+                <a16:creationId xmlns:a16="http://schemas.microsoft.com/office/drawing/2014/main" id="{CC7AB982-DD76-CF4E-B458-043F3664733A}"/>
               </a:ext>
             </a:extLst>
           </p:cNvPr>
@@ -54817,23 +55100,31 @@
           </p:cNvPicPr>
           <p:nvPr/>
         </p:nvPicPr>
-        <p:blipFill>
+        <p:blipFill rotWithShape="1">
           <a:blip r:embed="rId9">
+            <a:clrChange>
+              <a:clrFrom>
+                <a:srgbClr val="FFFFFF"/>
+              </a:clrFrom>
+              <a:clrTo>
+                <a:srgbClr val="FFFFFF">
+                  <a:alpha val="0"/>
+                </a:srgbClr>
+              </a:clrTo>
+            </a:clrChange>
             <a:extLst>
               <a:ext uri="{28A0092B-C50C-407E-A947-70E740481C1C}">
                 <a14:useLocalDpi xmlns:a14="http://schemas.microsoft.com/office/drawing/2010/main" val="0"/>
               </a:ext>
             </a:extLst>
           </a:blip>
-          <a:srcRect/>
-          <a:stretch>
-            <a:fillRect/>
-          </a:stretch>
+          <a:srcRect l="15167" t="11313" r="13580" b="15358"/>
+          <a:stretch/>
         </p:blipFill>
         <p:spPr bwMode="auto">
           <a:xfrm>
-            <a:off x="10801804" y="528318"/>
-            <a:ext cx="755054" cy="755054"/>
+            <a:off x="10708141" y="370924"/>
+            <a:ext cx="967432" cy="995619"/>
           </a:xfrm>
           <a:prstGeom prst="rect">
             <a:avLst/>
@@ -54921,18 +55212,18 @@
           <a:lstStyle/>
           <a:p>
             <a:r>
-              <a:rPr lang="de-DE" dirty="0"/>
+              <a:rPr lang="de-DE" b="1" dirty="0"/>
               <a:t>V</a:t>
             </a:r>
             <a:r>
-              <a:rPr lang="de-CH" dirty="0" err="1"/>
+              <a:rPr lang="de-CH" b="1" dirty="0" err="1"/>
               <a:t>orbereitung</a:t>
             </a:r>
             <a:r>
-              <a:rPr lang="de-CH" dirty="0"/>
+              <a:rPr lang="de-CH" b="1" dirty="0"/>
               <a:t> der Daten</a:t>
             </a:r>
-            <a:endParaRPr lang="de-CH" dirty="0">
+            <a:endParaRPr lang="de-CH" b="1" dirty="0">
               <a:solidFill>
                 <a:schemeClr val="tx1"/>
               </a:solidFill>
@@ -55307,18 +55598,18 @@
           <a:lstStyle/>
           <a:p>
             <a:r>
-              <a:rPr lang="de-DE" dirty="0"/>
+              <a:rPr lang="de-DE" b="1" dirty="0"/>
               <a:t>V</a:t>
             </a:r>
             <a:r>
-              <a:rPr lang="de-CH" dirty="0" err="1"/>
+              <a:rPr lang="de-CH" b="1" dirty="0" err="1"/>
               <a:t>orbereitung</a:t>
             </a:r>
             <a:r>
-              <a:rPr lang="de-CH" dirty="0"/>
+              <a:rPr lang="de-CH" b="1" dirty="0"/>
               <a:t> der Daten</a:t>
             </a:r>
-            <a:endParaRPr lang="de-CH" dirty="0">
+            <a:endParaRPr lang="de-CH" b="1" dirty="0">
               <a:solidFill>
                 <a:schemeClr val="tx1"/>
               </a:solidFill>
@@ -55693,10 +55984,10 @@
           <a:lstStyle/>
           <a:p>
             <a:r>
-              <a:rPr lang="de-CH" dirty="0"/>
+              <a:rPr lang="de-CH" b="1" dirty="0"/>
               <a:t>Vorbereitung der Daten</a:t>
             </a:r>
-            <a:endParaRPr lang="de-CH" dirty="0">
+            <a:endParaRPr lang="de-CH" b="1" dirty="0">
               <a:solidFill>
                 <a:schemeClr val="tx1"/>
               </a:solidFill>
@@ -56036,10 +56327,10 @@
           <a:lstStyle/>
           <a:p>
             <a:r>
-              <a:rPr lang="de-DE" dirty="0"/>
+              <a:rPr lang="de-DE" b="1" dirty="0"/>
               <a:t>Explorative Datenanalyse</a:t>
             </a:r>
-            <a:endParaRPr lang="de-CH" dirty="0">
+            <a:endParaRPr lang="de-CH" b="1" dirty="0">
               <a:solidFill>
                 <a:schemeClr val="tx1"/>
               </a:solidFill>
@@ -56327,14 +56618,14 @@
           <a:lstStyle/>
           <a:p>
             <a:r>
-              <a:rPr lang="de-DE" dirty="0">
+              <a:rPr lang="de-DE" b="1" dirty="0">
                 <a:solidFill>
                   <a:schemeClr val="tx1"/>
                 </a:solidFill>
               </a:rPr>
               <a:t>Histogramme</a:t>
             </a:r>
-            <a:endParaRPr lang="de-CH" dirty="0">
+            <a:endParaRPr lang="de-CH" b="1" dirty="0">
               <a:solidFill>
                 <a:schemeClr val="tx1"/>
               </a:solidFill>
@@ -56735,14 +57026,14 @@
           <a:lstStyle/>
           <a:p>
             <a:r>
-              <a:rPr lang="de-DE" dirty="0">
+              <a:rPr lang="de-DE" b="1" dirty="0">
                 <a:solidFill>
                   <a:schemeClr val="tx1"/>
                 </a:solidFill>
               </a:rPr>
               <a:t>Streudiagramme</a:t>
             </a:r>
-            <a:endParaRPr lang="de-CH" dirty="0">
+            <a:endParaRPr lang="de-CH" b="1" dirty="0">
               <a:solidFill>
                 <a:schemeClr val="tx1"/>
               </a:solidFill>

</xml_diff>

<commit_message>
changet ben to pascal
CDF
</commit_message>
<xml_diff>
--- a/Praesentation/Steinschlagrisiko_Präsentation.pptx
+++ b/Praesentation/Steinschlagrisiko_Präsentation.pptx
@@ -38479,7 +38479,7 @@
           <a:p>
             <a:fld id="{D249233E-F6E6-4BD5-8D0F-887AF9D15A80}" type="datetimeFigureOut">
               <a:rPr lang="de-CH" smtClean="0"/>
-              <a:t>25.01.22</a:t>
+              <a:t>26.01.22</a:t>
             </a:fld>
             <a:endParaRPr lang="de-CH"/>
           </a:p>
@@ -39234,7 +39234,7 @@
                 <a:effectLst/>
                 <a:latin typeface="Helvetica Neue"/>
               </a:rPr>
-              <a:t>Ben</a:t>
+              <a:t>Pascal</a:t>
             </a:r>
           </a:p>
         </p:txBody>
@@ -43535,7 +43535,7 @@
           <a:p>
             <a:fld id="{80020296-3345-4314-BE3C-63AEC21FFBF4}" type="datetime1">
               <a:rPr lang="en-US" smtClean="0"/>
-              <a:t>1/25/22</a:t>
+              <a:t>1/26/22</a:t>
             </a:fld>
             <a:endParaRPr lang="en-US" dirty="0"/>
           </a:p>
@@ -43737,7 +43737,7 @@
           <a:p>
             <a:fld id="{5F181BB4-B15F-4781-B18E-C61D89E95F1F}" type="datetime1">
               <a:rPr lang="en-US" smtClean="0"/>
-              <a:t>1/25/22</a:t>
+              <a:t>1/26/22</a:t>
             </a:fld>
             <a:endParaRPr lang="en-US" dirty="0"/>
           </a:p>
@@ -43949,7 +43949,7 @@
           <a:p>
             <a:fld id="{389CB775-4552-4EC9-934E-115299A87317}" type="datetime1">
               <a:rPr lang="en-US" smtClean="0"/>
-              <a:t>1/25/22</a:t>
+              <a:t>1/26/22</a:t>
             </a:fld>
             <a:endParaRPr lang="en-US" dirty="0"/>
           </a:p>
@@ -44151,7 +44151,7 @@
           <a:p>
             <a:fld id="{2F906713-C74A-4CBA-B694-821617ABFF32}" type="datetime1">
               <a:rPr lang="en-US" smtClean="0"/>
-              <a:t>1/25/22</a:t>
+              <a:t>1/26/22</a:t>
             </a:fld>
             <a:endParaRPr lang="en-US" dirty="0"/>
           </a:p>
@@ -44429,7 +44429,7 @@
           <a:p>
             <a:fld id="{EBFE4EE4-C210-49E2-AD1E-E46D3766A14E}" type="datetime1">
               <a:rPr lang="en-US" smtClean="0"/>
-              <a:t>1/25/22</a:t>
+              <a:t>1/26/22</a:t>
             </a:fld>
             <a:endParaRPr lang="en-US" dirty="0"/>
           </a:p>
@@ -44699,7 +44699,7 @@
           <a:p>
             <a:fld id="{38196C97-E1A4-4DAC-B18B-328B9AC2380F}" type="datetime1">
               <a:rPr lang="en-US" smtClean="0"/>
-              <a:t>1/25/22</a:t>
+              <a:t>1/26/22</a:t>
             </a:fld>
             <a:endParaRPr lang="en-US" dirty="0"/>
           </a:p>
@@ -45116,7 +45116,7 @@
           <a:p>
             <a:fld id="{93CF6138-A04F-4243-B578-72E7982DA47A}" type="datetime1">
               <a:rPr lang="en-US" smtClean="0"/>
-              <a:t>1/25/22</a:t>
+              <a:t>1/26/22</a:t>
             </a:fld>
             <a:endParaRPr lang="en-US" dirty="0"/>
           </a:p>
@@ -45260,7 +45260,7 @@
           <a:p>
             <a:fld id="{A69CADF8-4F87-44CE-B6CA-F34C8A1A97DF}" type="datetime1">
               <a:rPr lang="en-US" smtClean="0"/>
-              <a:t>1/25/22</a:t>
+              <a:t>1/26/22</a:t>
             </a:fld>
             <a:endParaRPr lang="en-US" dirty="0"/>
           </a:p>
@@ -45375,7 +45375,7 @@
           <a:p>
             <a:fld id="{23E56F23-EBFB-4093-A04D-056E9FF698EB}" type="datetime1">
               <a:rPr lang="en-US" smtClean="0"/>
-              <a:t>1/25/22</a:t>
+              <a:t>1/26/22</a:t>
             </a:fld>
             <a:endParaRPr lang="en-US" dirty="0"/>
           </a:p>
@@ -45690,7 +45690,7 @@
           <a:p>
             <a:fld id="{1D10089C-A521-4DD8-8C2F-F1136A3C80BD}" type="datetime1">
               <a:rPr lang="en-US" smtClean="0"/>
-              <a:t>1/25/22</a:t>
+              <a:t>1/26/22</a:t>
             </a:fld>
             <a:endParaRPr lang="en-US" dirty="0"/>
           </a:p>
@@ -45981,7 +45981,7 @@
           <a:p>
             <a:fld id="{DAB5D9C6-B34D-43D8-9E4F-1282694CB653}" type="datetime1">
               <a:rPr lang="en-US" smtClean="0"/>
-              <a:t>1/25/22</a:t>
+              <a:t>1/26/22</a:t>
             </a:fld>
             <a:endParaRPr lang="en-US" dirty="0"/>
           </a:p>
@@ -46226,7 +46226,7 @@
           <a:p>
             <a:fld id="{CD4C00DD-07A2-4DC7-B463-BADC4CE40A75}" type="datetime1">
               <a:rPr lang="en-US" smtClean="0"/>
-              <a:t>1/25/22</a:t>
+              <a:t>1/26/22</a:t>
             </a:fld>
             <a:endParaRPr lang="en-US" dirty="0"/>
           </a:p>

</xml_diff>